<commit_message>
Updating Doc with Brochure, Slides (PDF), etc..
</commit_message>
<xml_diff>
--- a/Doc/MLSA Poster.pptx
+++ b/Doc/MLSA Poster.pptx
@@ -2,7 +2,7 @@
 <file path=ppt/presentation.xml><?xml version="1.0" encoding="utf-8"?>
 <p:presentation xmlns:a="http://schemas.openxmlformats.org/drawingml/2006/main" xmlns:r="http://schemas.openxmlformats.org/officeDocument/2006/relationships" xmlns:p="http://schemas.openxmlformats.org/presentationml/2006/main" saveSubsetFonts="1">
   <p:sldMasterIdLst>
-    <p:sldMasterId id="2147483660" r:id="rId1"/>
+    <p:sldMasterId id="2147483744" r:id="rId1"/>
   </p:sldMasterIdLst>
   <p:sldIdLst>
     <p:sldId id="256" r:id="rId2"/>
@@ -104,6 +104,11 @@
       </a:defRPr>
     </a:lvl9pPr>
   </p:defaultTextStyle>
+  <p:extLst>
+    <p:ext uri="{EFAFB233-063F-42B5-8137-9DF3F51BA10A}">
+      <p15:sldGuideLst xmlns:p15="http://schemas.microsoft.com/office/powerpoint/2012/main"/>
+    </p:ext>
+  </p:extLst>
 </p:presentation>
 </file>
 
@@ -114,6 +119,14 @@
 <file path=ppt/slideLayouts/slideLayout1.xml><?xml version="1.0" encoding="utf-8"?>
 <p:sldLayout xmlns:a="http://schemas.openxmlformats.org/drawingml/2006/main" xmlns:r="http://schemas.openxmlformats.org/officeDocument/2006/relationships" xmlns:p="http://schemas.openxmlformats.org/presentationml/2006/main" type="title" preserve="1">
   <p:cSld name="Title Slide">
+    <p:bg>
+      <p:bgPr>
+        <a:solidFill>
+          <a:schemeClr val="accent2"/>
+        </a:solidFill>
+        <a:effectLst/>
+      </p:bgPr>
+    </p:bg>
     <p:spTree>
       <p:nvGrpSpPr>
         <p:cNvPr id="1" name=""/>
@@ -140,15 +153,29 @@
         </p:nvSpPr>
         <p:spPr>
           <a:xfrm>
-            <a:off x="2268022" y="6952156"/>
-            <a:ext cx="25704245" cy="14789303"/>
-          </a:xfrm>
-        </p:spPr>
-        <p:txBody>
-          <a:bodyPr anchor="b"/>
+            <a:off x="3645238" y="14784001"/>
+            <a:ext cx="22949812" cy="10195179"/>
+          </a:xfrm>
+          <a:solidFill>
+            <a:srgbClr val="FFFFFF"/>
+          </a:solidFill>
+          <a:ln w="38100">
+            <a:solidFill>
+              <a:srgbClr val="404040"/>
+            </a:solidFill>
+          </a:ln>
+        </p:spPr>
+        <p:txBody>
+          <a:bodyPr lIns="274320" rIns="274320" anchor="ctr" anchorCtr="1">
+            <a:normAutofit/>
+          </a:bodyPr>
           <a:lstStyle>
             <a:lvl1pPr algn="ctr">
-              <a:defRPr sz="19843"/>
+              <a:defRPr sz="11575">
+                <a:solidFill>
+                  <a:srgbClr val="262626"/>
+                </a:solidFill>
+              </a:defRPr>
             </a:lvl1pPr>
           </a:lstStyle>
           <a:p>
@@ -172,20 +199,30 @@
         </p:nvSpPr>
         <p:spPr>
           <a:xfrm>
-            <a:off x="3780036" y="22311791"/>
-            <a:ext cx="22680216" cy="10256143"/>
-          </a:xfrm>
-        </p:spPr>
-        <p:txBody>
-          <a:bodyPr/>
+            <a:off x="6684997" y="26960585"/>
+            <a:ext cx="16870301" cy="7680168"/>
+          </a:xfrm>
+          <a:noFill/>
+        </p:spPr>
+        <p:txBody>
+          <a:bodyPr>
+            <a:normAutofit/>
+          </a:bodyPr>
           <a:lstStyle>
             <a:lvl1pPr marL="0" indent="0" algn="ctr">
               <a:buNone/>
-              <a:defRPr sz="7937"/>
+              <a:defRPr sz="6283">
+                <a:solidFill>
+                  <a:schemeClr val="tx1">
+                    <a:lumMod val="75000"/>
+                    <a:lumOff val="25000"/>
+                  </a:schemeClr>
+                </a:solidFill>
+              </a:defRPr>
             </a:lvl1pPr>
             <a:lvl2pPr marL="1512006" indent="0" algn="ctr">
               <a:buNone/>
-              <a:defRPr sz="6614"/>
+              <a:defRPr sz="6283"/>
             </a:lvl2pPr>
             <a:lvl3pPr marL="3024012" indent="0" algn="ctr">
               <a:buNone/>
@@ -227,7 +264,7 @@
       </p:sp>
       <p:sp>
         <p:nvSpPr>
-          <p:cNvPr id="4" name="Date Placeholder 3"/>
+          <p:cNvPr id="7" name="Date Placeholder 6"/>
           <p:cNvSpPr>
             <a:spLocks noGrp="1"/>
           </p:cNvSpPr>
@@ -242,7 +279,7 @@
           <a:p>
             <a:fld id="{D467A5D1-AEE8-4769-967D-BA49E042033D}" type="datetimeFigureOut">
               <a:rPr lang="en-US" smtClean="0"/>
-              <a:t>7/7/2017</a:t>
+              <a:t>7/19/17</a:t>
             </a:fld>
             <a:endParaRPr lang="en-US"/>
           </a:p>
@@ -250,7 +287,7 @@
       </p:sp>
       <p:sp>
         <p:nvSpPr>
-          <p:cNvPr id="5" name="Footer Placeholder 4"/>
+          <p:cNvPr id="8" name="Footer Placeholder 7"/>
           <p:cNvSpPr>
             <a:spLocks noGrp="1"/>
           </p:cNvSpPr>
@@ -269,7 +306,7 @@
       </p:sp>
       <p:sp>
         <p:nvSpPr>
-          <p:cNvPr id="6" name="Slide Number Placeholder 5"/>
+          <p:cNvPr id="9" name="Slide Number Placeholder 8"/>
           <p:cNvSpPr>
             <a:spLocks noGrp="1"/>
           </p:cNvSpPr>
@@ -293,12 +330,12 @@
     </p:spTree>
     <p:extLst>
       <p:ext uri="{BB962C8B-B14F-4D97-AF65-F5344CB8AC3E}">
-        <p14:creationId xmlns:p14="http://schemas.microsoft.com/office/powerpoint/2010/main" val="1566793877"/>
+        <p14:creationId xmlns:p14="http://schemas.microsoft.com/office/powerpoint/2010/main" val="410645003"/>
       </p:ext>
     </p:extLst>
   </p:cSld>
   <p:clrMapOvr>
-    <a:masterClrMapping/>
+    <a:overrideClrMapping bg1="dk1" tx1="lt1" bg2="dk2" tx2="lt2" accent1="accent1" accent2="accent2" accent3="accent3" accent4="accent4" accent5="accent5" accent6="accent6" hlink="hlink" folHlink="folHlink"/>
   </p:clrMapOvr>
 </p:sldLayout>
 </file>
@@ -361,7 +398,7 @@
             <a:pPr lvl="0"/>
             <a:r>
               <a:rPr lang="en-US"/>
-              <a:t>Edit Master text styles</a:t>
+              <a:t>Click to edit Master text styles</a:t>
             </a:r>
           </a:p>
           <a:p>
@@ -412,7 +449,7 @@
           <a:p>
             <a:fld id="{D467A5D1-AEE8-4769-967D-BA49E042033D}" type="datetimeFigureOut">
               <a:rPr lang="en-US" smtClean="0"/>
-              <a:t>7/7/2017</a:t>
+              <a:t>7/19/17</a:t>
             </a:fld>
             <a:endParaRPr lang="en-US"/>
           </a:p>
@@ -463,7 +500,7 @@
     </p:spTree>
     <p:extLst>
       <p:ext uri="{BB962C8B-B14F-4D97-AF65-F5344CB8AC3E}">
-        <p14:creationId xmlns:p14="http://schemas.microsoft.com/office/powerpoint/2010/main" val="666404794"/>
+        <p14:creationId xmlns:p14="http://schemas.microsoft.com/office/powerpoint/2010/main" val="1315687691"/>
       </p:ext>
     </p:extLst>
   </p:cSld>
@@ -502,8 +539,8 @@
         </p:nvSpPr>
         <p:spPr>
           <a:xfrm>
-            <a:off x="21640708" y="2261662"/>
-            <a:ext cx="6520562" cy="35999763"/>
+            <a:off x="21462648" y="5805588"/>
+            <a:ext cx="3485590" cy="30868737"/>
           </a:xfrm>
         </p:spPr>
         <p:txBody>
@@ -530,8 +567,8 @@
         </p:nvSpPr>
         <p:spPr>
           <a:xfrm>
-            <a:off x="2079021" y="2261662"/>
-            <a:ext cx="19183683" cy="35999763"/>
+            <a:off x="5311384" y="5805588"/>
+            <a:ext cx="15596944" cy="30868737"/>
           </a:xfrm>
         </p:spPr>
         <p:txBody>
@@ -541,7 +578,7 @@
             <a:pPr lvl="0"/>
             <a:r>
               <a:rPr lang="en-US"/>
-              <a:t>Edit Master text styles</a:t>
+              <a:t>Click to edit Master text styles</a:t>
             </a:r>
           </a:p>
           <a:p>
@@ -592,7 +629,7 @@
           <a:p>
             <a:fld id="{D467A5D1-AEE8-4769-967D-BA49E042033D}" type="datetimeFigureOut">
               <a:rPr lang="en-US" smtClean="0"/>
-              <a:t>7/7/2017</a:t>
+              <a:t>7/19/17</a:t>
             </a:fld>
             <a:endParaRPr lang="en-US"/>
           </a:p>
@@ -643,7 +680,7 @@
     </p:spTree>
     <p:extLst>
       <p:ext uri="{BB962C8B-B14F-4D97-AF65-F5344CB8AC3E}">
-        <p14:creationId xmlns:p14="http://schemas.microsoft.com/office/powerpoint/2010/main" val="2210959834"/>
+        <p14:creationId xmlns:p14="http://schemas.microsoft.com/office/powerpoint/2010/main" val="123909478"/>
       </p:ext>
     </p:extLst>
   </p:cSld>
@@ -711,7 +748,7 @@
             <a:pPr lvl="0"/>
             <a:r>
               <a:rPr lang="en-US"/>
-              <a:t>Edit Master text styles</a:t>
+              <a:t>Click to edit Master text styles</a:t>
             </a:r>
           </a:p>
           <a:p>
@@ -747,7 +784,7 @@
       </p:sp>
       <p:sp>
         <p:nvSpPr>
-          <p:cNvPr id="4" name="Date Placeholder 3"/>
+          <p:cNvPr id="7" name="Date Placeholder 6"/>
           <p:cNvSpPr>
             <a:spLocks noGrp="1"/>
           </p:cNvSpPr>
@@ -762,7 +799,7 @@
           <a:p>
             <a:fld id="{D467A5D1-AEE8-4769-967D-BA49E042033D}" type="datetimeFigureOut">
               <a:rPr lang="en-US" smtClean="0"/>
-              <a:t>7/7/2017</a:t>
+              <a:t>7/19/17</a:t>
             </a:fld>
             <a:endParaRPr lang="en-US"/>
           </a:p>
@@ -770,7 +807,7 @@
       </p:sp>
       <p:sp>
         <p:nvSpPr>
-          <p:cNvPr id="5" name="Footer Placeholder 4"/>
+          <p:cNvPr id="8" name="Footer Placeholder 7"/>
           <p:cNvSpPr>
             <a:spLocks noGrp="1"/>
           </p:cNvSpPr>
@@ -789,7 +826,7 @@
       </p:sp>
       <p:sp>
         <p:nvSpPr>
-          <p:cNvPr id="6" name="Slide Number Placeholder 5"/>
+          <p:cNvPr id="9" name="Slide Number Placeholder 8"/>
           <p:cNvSpPr>
             <a:spLocks noGrp="1"/>
           </p:cNvSpPr>
@@ -813,7 +850,7 @@
     </p:spTree>
     <p:extLst>
       <p:ext uri="{BB962C8B-B14F-4D97-AF65-F5344CB8AC3E}">
-        <p14:creationId xmlns:p14="http://schemas.microsoft.com/office/powerpoint/2010/main" val="1382322915"/>
+        <p14:creationId xmlns:p14="http://schemas.microsoft.com/office/powerpoint/2010/main" val="1845607610"/>
       </p:ext>
     </p:extLst>
   </p:cSld>
@@ -826,6 +863,14 @@
 <file path=ppt/slideLayouts/slideLayout3.xml><?xml version="1.0" encoding="utf-8"?>
 <p:sldLayout xmlns:a="http://schemas.openxmlformats.org/drawingml/2006/main" xmlns:r="http://schemas.openxmlformats.org/officeDocument/2006/relationships" xmlns:p="http://schemas.openxmlformats.org/presentationml/2006/main" type="secHead" preserve="1">
   <p:cSld name="Section Header">
+    <p:bg>
+      <p:bgPr>
+        <a:solidFill>
+          <a:schemeClr val="accent1"/>
+        </a:solidFill>
+        <a:effectLst/>
+      </p:bgPr>
+    </p:bg>
     <p:spTree>
       <p:nvGrpSpPr>
         <p:cNvPr id="1" name=""/>
@@ -852,15 +897,29 @@
         </p:nvSpPr>
         <p:spPr>
           <a:xfrm>
-            <a:off x="2063272" y="10590491"/>
-            <a:ext cx="26082248" cy="17670461"/>
-          </a:xfrm>
-        </p:spPr>
-        <p:txBody>
-          <a:bodyPr anchor="b"/>
+            <a:off x="3659075" y="14784001"/>
+            <a:ext cx="22952379" cy="10195179"/>
+          </a:xfrm>
+          <a:solidFill>
+            <a:srgbClr val="FFFFFF"/>
+          </a:solidFill>
+          <a:ln w="38100">
+            <a:solidFill>
+              <a:srgbClr val="404040"/>
+            </a:solidFill>
+          </a:ln>
+        </p:spPr>
+        <p:txBody>
+          <a:bodyPr lIns="274320" rIns="274320" anchor="ctr" anchorCtr="1">
+            <a:normAutofit/>
+          </a:bodyPr>
           <a:lstStyle>
             <a:lvl1pPr>
-              <a:defRPr sz="19843"/>
+              <a:defRPr sz="11575">
+                <a:solidFill>
+                  <a:srgbClr val="262626"/>
+                </a:solidFill>
+              </a:defRPr>
             </a:lvl1pPr>
           </a:lstStyle>
           <a:p>
@@ -884,16 +943,18 @@
         </p:nvSpPr>
         <p:spPr>
           <a:xfrm>
-            <a:off x="2063272" y="28428121"/>
-            <a:ext cx="26082248" cy="9292478"/>
-          </a:xfrm>
-        </p:spPr>
-        <p:txBody>
-          <a:bodyPr/>
+            <a:off x="6684997" y="26960096"/>
+            <a:ext cx="16870301" cy="7836187"/>
+          </a:xfrm>
+        </p:spPr>
+        <p:txBody>
+          <a:bodyPr anchor="t" anchorCtr="1">
+            <a:normAutofit/>
+          </a:bodyPr>
           <a:lstStyle>
             <a:lvl1pPr marL="0" indent="0">
               <a:buNone/>
-              <a:defRPr sz="7937">
+              <a:defRPr sz="6283">
                 <a:solidFill>
                   <a:schemeClr val="tx1"/>
                 </a:solidFill>
@@ -901,7 +962,7 @@
             </a:lvl1pPr>
             <a:lvl2pPr marL="1512006" indent="0">
               <a:buNone/>
-              <a:defRPr sz="6614">
+              <a:defRPr sz="6283">
                 <a:solidFill>
                   <a:schemeClr val="tx1">
                     <a:tint val="75000"/>
@@ -984,14 +1045,14 @@
             <a:pPr lvl="0"/>
             <a:r>
               <a:rPr lang="en-US"/>
-              <a:t>Edit Master text styles</a:t>
-            </a:r>
-          </a:p>
-        </p:txBody>
-      </p:sp>
-      <p:sp>
-        <p:nvSpPr>
-          <p:cNvPr id="4" name="Date Placeholder 3"/>
+              <a:t>Click to edit Master text styles</a:t>
+            </a:r>
+          </a:p>
+        </p:txBody>
+      </p:sp>
+      <p:sp>
+        <p:nvSpPr>
+          <p:cNvPr id="7" name="Date Placeholder 6"/>
           <p:cNvSpPr>
             <a:spLocks noGrp="1"/>
           </p:cNvSpPr>
@@ -1006,7 +1067,7 @@
           <a:p>
             <a:fld id="{D467A5D1-AEE8-4769-967D-BA49E042033D}" type="datetimeFigureOut">
               <a:rPr lang="en-US" smtClean="0"/>
-              <a:t>7/7/2017</a:t>
+              <a:t>7/19/17</a:t>
             </a:fld>
             <a:endParaRPr lang="en-US"/>
           </a:p>
@@ -1014,7 +1075,7 @@
       </p:sp>
       <p:sp>
         <p:nvSpPr>
-          <p:cNvPr id="5" name="Footer Placeholder 4"/>
+          <p:cNvPr id="8" name="Footer Placeholder 7"/>
           <p:cNvSpPr>
             <a:spLocks noGrp="1"/>
           </p:cNvSpPr>
@@ -1033,7 +1094,7 @@
       </p:sp>
       <p:sp>
         <p:nvSpPr>
-          <p:cNvPr id="6" name="Slide Number Placeholder 5"/>
+          <p:cNvPr id="9" name="Slide Number Placeholder 8"/>
           <p:cNvSpPr>
             <a:spLocks noGrp="1"/>
           </p:cNvSpPr>
@@ -1057,12 +1118,12 @@
     </p:spTree>
     <p:extLst>
       <p:ext uri="{BB962C8B-B14F-4D97-AF65-F5344CB8AC3E}">
-        <p14:creationId xmlns:p14="http://schemas.microsoft.com/office/powerpoint/2010/main" val="3650617326"/>
+        <p14:creationId xmlns:p14="http://schemas.microsoft.com/office/powerpoint/2010/main" val="873304002"/>
       </p:ext>
     </p:extLst>
   </p:cSld>
   <p:clrMapOvr>
-    <a:masterClrMapping/>
+    <a:overrideClrMapping bg1="dk1" tx1="lt1" bg2="dk2" tx2="lt2" accent1="accent1" accent2="accent2" accent3="accent3" accent4="accent4" accent5="accent5" accent6="accent6" hlink="hlink" folHlink="folHlink"/>
   </p:clrMapOvr>
 </p:sldLayout>
 </file>
@@ -1119,8 +1180,8 @@
         </p:nvSpPr>
         <p:spPr>
           <a:xfrm>
-            <a:off x="2079020" y="11308310"/>
-            <a:ext cx="12852122" cy="26953115"/>
+            <a:off x="3645236" y="16340607"/>
+            <a:ext cx="10873880" cy="19214337"/>
           </a:xfrm>
         </p:spPr>
         <p:txBody>
@@ -1130,7 +1191,7 @@
             <a:pPr lvl="0"/>
             <a:r>
               <a:rPr lang="en-US"/>
-              <a:t>Edit Master text styles</a:t>
+              <a:t>Click to edit Master text styles</a:t>
             </a:r>
           </a:p>
           <a:p>
@@ -1176,8 +1237,8 @@
         </p:nvSpPr>
         <p:spPr>
           <a:xfrm>
-            <a:off x="15309146" y="11308310"/>
-            <a:ext cx="12852122" cy="26953115"/>
+            <a:off x="15721170" y="16340607"/>
+            <a:ext cx="10882125" cy="19214337"/>
           </a:xfrm>
         </p:spPr>
         <p:txBody>
@@ -1187,7 +1248,7 @@
             <a:pPr lvl="0"/>
             <a:r>
               <a:rPr lang="en-US"/>
-              <a:t>Edit Master text styles</a:t>
+              <a:t>Click to edit Master text styles</a:t>
             </a:r>
           </a:p>
           <a:p>
@@ -1223,7 +1284,7 @@
       </p:sp>
       <p:sp>
         <p:nvSpPr>
-          <p:cNvPr id="5" name="Date Placeholder 4"/>
+          <p:cNvPr id="8" name="Date Placeholder 7"/>
           <p:cNvSpPr>
             <a:spLocks noGrp="1"/>
           </p:cNvSpPr>
@@ -1238,7 +1299,7 @@
           <a:p>
             <a:fld id="{D467A5D1-AEE8-4769-967D-BA49E042033D}" type="datetimeFigureOut">
               <a:rPr lang="en-US" smtClean="0"/>
-              <a:t>7/7/2017</a:t>
+              <a:t>7/19/17</a:t>
             </a:fld>
             <a:endParaRPr lang="en-US"/>
           </a:p>
@@ -1246,7 +1307,7 @@
       </p:sp>
       <p:sp>
         <p:nvSpPr>
-          <p:cNvPr id="6" name="Footer Placeholder 5"/>
+          <p:cNvPr id="9" name="Footer Placeholder 8"/>
           <p:cNvSpPr>
             <a:spLocks noGrp="1"/>
           </p:cNvSpPr>
@@ -1265,7 +1326,7 @@
       </p:sp>
       <p:sp>
         <p:nvSpPr>
-          <p:cNvPr id="7" name="Slide Number Placeholder 6"/>
+          <p:cNvPr id="10" name="Slide Number Placeholder 9"/>
           <p:cNvSpPr>
             <a:spLocks noGrp="1"/>
           </p:cNvSpPr>
@@ -1289,7 +1350,7 @@
     </p:spTree>
     <p:extLst>
       <p:ext uri="{BB962C8B-B14F-4D97-AF65-F5344CB8AC3E}">
-        <p14:creationId xmlns:p14="http://schemas.microsoft.com/office/powerpoint/2010/main" val="2409500927"/>
+        <p14:creationId xmlns:p14="http://schemas.microsoft.com/office/powerpoint/2010/main" val="1717118016"/>
       </p:ext>
     </p:extLst>
   </p:cSld>
@@ -1318,34 +1379,6 @@
       </p:grpSpPr>
       <p:sp>
         <p:nvSpPr>
-          <p:cNvPr id="2" name="Title 1"/>
-          <p:cNvSpPr>
-            <a:spLocks noGrp="1"/>
-          </p:cNvSpPr>
-          <p:nvPr>
-            <p:ph type="title"/>
-          </p:nvPr>
-        </p:nvSpPr>
-        <p:spPr>
-          <a:xfrm>
-            <a:off x="2082959" y="2261671"/>
-            <a:ext cx="26082248" cy="8210820"/>
-          </a:xfrm>
-        </p:spPr>
-        <p:txBody>
-          <a:bodyPr/>
-          <a:lstStyle/>
-          <a:p>
-            <a:r>
-              <a:rPr lang="en-US"/>
-              <a:t>Click to edit Master title style</a:t>
-            </a:r>
-            <a:endParaRPr lang="en-US" dirty="0"/>
-          </a:p>
-        </p:txBody>
-      </p:sp>
-      <p:sp>
-        <p:nvSpPr>
           <p:cNvPr id="3" name="Text Placeholder 2"/>
           <p:cNvSpPr>
             <a:spLocks noGrp="1"/>
@@ -1356,20 +1389,26 @@
         </p:nvSpPr>
         <p:spPr>
           <a:xfrm>
-            <a:off x="2082962" y="10413482"/>
-            <a:ext cx="12793057" cy="5103486"/>
-          </a:xfrm>
-        </p:spPr>
-        <p:txBody>
-          <a:bodyPr anchor="b"/>
+            <a:off x="3645234" y="14329906"/>
+            <a:ext cx="10873884" cy="4361265"/>
+          </a:xfrm>
+        </p:spPr>
+        <p:txBody>
+          <a:bodyPr anchor="b" anchorCtr="1">
+            <a:normAutofit/>
+          </a:bodyPr>
           <a:lstStyle>
-            <a:lvl1pPr marL="0" indent="0">
-              <a:buNone/>
-              <a:defRPr sz="7937" b="1"/>
+            <a:lvl1pPr marL="0" indent="0" algn="ctr">
+              <a:buNone/>
+              <a:defRPr sz="6283" b="0" cap="all" spc="331" baseline="0">
+                <a:solidFill>
+                  <a:schemeClr val="tx2"/>
+                </a:solidFill>
+              </a:defRPr>
             </a:lvl1pPr>
             <a:lvl2pPr marL="1512006" indent="0">
               <a:buNone/>
-              <a:defRPr sz="6614" b="1"/>
+              <a:defRPr sz="6283" b="1"/>
             </a:lvl2pPr>
             <a:lvl3pPr marL="3024012" indent="0">
               <a:buNone/>
@@ -1404,7 +1443,7 @@
             <a:pPr lvl="0"/>
             <a:r>
               <a:rPr lang="en-US"/>
-              <a:t>Edit Master text styles</a:t>
+              <a:t>Click to edit Master text styles</a:t>
             </a:r>
           </a:p>
         </p:txBody>
@@ -1421,8 +1460,8 @@
         </p:nvSpPr>
         <p:spPr>
           <a:xfrm>
-            <a:off x="2082962" y="15516968"/>
-            <a:ext cx="12793057" cy="22823123"/>
+            <a:off x="3645234" y="19469960"/>
+            <a:ext cx="10873884" cy="16084984"/>
           </a:xfrm>
         </p:spPr>
         <p:txBody>
@@ -1432,7 +1471,7 @@
             <a:pPr lvl="0"/>
             <a:r>
               <a:rPr lang="en-US"/>
-              <a:t>Edit Master text styles</a:t>
+              <a:t>Click to edit Master text styles</a:t>
             </a:r>
           </a:p>
           <a:p>
@@ -1463,71 +1502,6 @@
               <a:t>Fifth level</a:t>
             </a:r>
             <a:endParaRPr lang="en-US" dirty="0"/>
-          </a:p>
-        </p:txBody>
-      </p:sp>
-      <p:sp>
-        <p:nvSpPr>
-          <p:cNvPr id="5" name="Text Placeholder 4"/>
-          <p:cNvSpPr>
-            <a:spLocks noGrp="1"/>
-          </p:cNvSpPr>
-          <p:nvPr>
-            <p:ph type="body" sz="quarter" idx="3"/>
-          </p:nvPr>
-        </p:nvSpPr>
-        <p:spPr>
-          <a:xfrm>
-            <a:off x="15309148" y="10413482"/>
-            <a:ext cx="12856061" cy="5103486"/>
-          </a:xfrm>
-        </p:spPr>
-        <p:txBody>
-          <a:bodyPr anchor="b"/>
-          <a:lstStyle>
-            <a:lvl1pPr marL="0" indent="0">
-              <a:buNone/>
-              <a:defRPr sz="7937" b="1"/>
-            </a:lvl1pPr>
-            <a:lvl2pPr marL="1512006" indent="0">
-              <a:buNone/>
-              <a:defRPr sz="6614" b="1"/>
-            </a:lvl2pPr>
-            <a:lvl3pPr marL="3024012" indent="0">
-              <a:buNone/>
-              <a:defRPr sz="5953" b="1"/>
-            </a:lvl3pPr>
-            <a:lvl4pPr marL="4536018" indent="0">
-              <a:buNone/>
-              <a:defRPr sz="5291" b="1"/>
-            </a:lvl4pPr>
-            <a:lvl5pPr marL="6048024" indent="0">
-              <a:buNone/>
-              <a:defRPr sz="5291" b="1"/>
-            </a:lvl5pPr>
-            <a:lvl6pPr marL="7560031" indent="0">
-              <a:buNone/>
-              <a:defRPr sz="5291" b="1"/>
-            </a:lvl6pPr>
-            <a:lvl7pPr marL="9072037" indent="0">
-              <a:buNone/>
-              <a:defRPr sz="5291" b="1"/>
-            </a:lvl7pPr>
-            <a:lvl8pPr marL="10584043" indent="0">
-              <a:buNone/>
-              <a:defRPr sz="5291" b="1"/>
-            </a:lvl8pPr>
-            <a:lvl9pPr marL="12096049" indent="0">
-              <a:buNone/>
-              <a:defRPr sz="5291" b="1"/>
-            </a:lvl9pPr>
-          </a:lstStyle>
-          <a:p>
-            <a:pPr lvl="0"/>
-            <a:r>
-              <a:rPr lang="en-US"/>
-              <a:t>Edit Master text styles</a:t>
-            </a:r>
           </a:p>
         </p:txBody>
       </p:sp>
@@ -1543,18 +1517,22 @@
         </p:nvSpPr>
         <p:spPr>
           <a:xfrm>
-            <a:off x="15309148" y="15516968"/>
-            <a:ext cx="12856061" cy="22823123"/>
+            <a:off x="15721170" y="19469960"/>
+            <a:ext cx="10882125" cy="16084984"/>
           </a:xfrm>
         </p:spPr>
         <p:txBody>
           <a:bodyPr/>
-          <a:lstStyle/>
+          <a:lstStyle>
+            <a:lvl5pPr>
+              <a:defRPr/>
+            </a:lvl5pPr>
+          </a:lstStyle>
           <a:p>
             <a:pPr lvl="0"/>
             <a:r>
               <a:rPr lang="en-US"/>
-              <a:t>Edit Master text styles</a:t>
+              <a:t>Click to edit Master text styles</a:t>
             </a:r>
           </a:p>
           <a:p>
@@ -1585,6 +1563,77 @@
               <a:t>Fifth level</a:t>
             </a:r>
             <a:endParaRPr lang="en-US" dirty="0"/>
+          </a:p>
+        </p:txBody>
+      </p:sp>
+      <p:sp>
+        <p:nvSpPr>
+          <p:cNvPr id="11" name="Text Placeholder 4"/>
+          <p:cNvSpPr>
+            <a:spLocks noGrp="1"/>
+          </p:cNvSpPr>
+          <p:nvPr>
+            <p:ph type="body" sz="quarter" idx="13"/>
+          </p:nvPr>
+        </p:nvSpPr>
+        <p:spPr>
+          <a:xfrm>
+            <a:off x="15721170" y="14329906"/>
+            <a:ext cx="10882125" cy="4361265"/>
+          </a:xfrm>
+        </p:spPr>
+        <p:txBody>
+          <a:bodyPr anchor="b" anchorCtr="1">
+            <a:normAutofit/>
+          </a:bodyPr>
+          <a:lstStyle>
+            <a:lvl1pPr marL="0" indent="0" algn="ctr">
+              <a:buNone/>
+              <a:defRPr sz="6283" b="0" cap="all" spc="331" baseline="0">
+                <a:solidFill>
+                  <a:schemeClr val="tx2"/>
+                </a:solidFill>
+              </a:defRPr>
+            </a:lvl1pPr>
+            <a:lvl2pPr marL="1512006" indent="0">
+              <a:buNone/>
+              <a:defRPr sz="6283" b="1"/>
+            </a:lvl2pPr>
+            <a:lvl3pPr marL="3024012" indent="0">
+              <a:buNone/>
+              <a:defRPr sz="5953" b="1"/>
+            </a:lvl3pPr>
+            <a:lvl4pPr marL="4536018" indent="0">
+              <a:buNone/>
+              <a:defRPr sz="5291" b="1"/>
+            </a:lvl4pPr>
+            <a:lvl5pPr marL="6048024" indent="0">
+              <a:buNone/>
+              <a:defRPr sz="5291" b="1"/>
+            </a:lvl5pPr>
+            <a:lvl6pPr marL="7560031" indent="0">
+              <a:buNone/>
+              <a:defRPr sz="5291" b="1"/>
+            </a:lvl6pPr>
+            <a:lvl7pPr marL="9072037" indent="0">
+              <a:buNone/>
+              <a:defRPr sz="5291" b="1"/>
+            </a:lvl7pPr>
+            <a:lvl8pPr marL="10584043" indent="0">
+              <a:buNone/>
+              <a:defRPr sz="5291" b="1"/>
+            </a:lvl8pPr>
+            <a:lvl9pPr marL="12096049" indent="0">
+              <a:buNone/>
+              <a:defRPr sz="5291" b="1"/>
+            </a:lvl9pPr>
+          </a:lstStyle>
+          <a:p>
+            <a:pPr lvl="0"/>
+            <a:r>
+              <a:rPr lang="en-US"/>
+              <a:t>Click to edit Master text styles</a:t>
+            </a:r>
           </a:p>
         </p:txBody>
       </p:sp>
@@ -1605,7 +1654,7 @@
           <a:p>
             <a:fld id="{D467A5D1-AEE8-4769-967D-BA49E042033D}" type="datetimeFigureOut">
               <a:rPr lang="en-US" smtClean="0"/>
-              <a:t>7/7/2017</a:t>
+              <a:t>7/19/17</a:t>
             </a:fld>
             <a:endParaRPr lang="en-US"/>
           </a:p>
@@ -1653,10 +1702,33 @@
           </a:p>
         </p:txBody>
       </p:sp>
+      <p:sp>
+        <p:nvSpPr>
+          <p:cNvPr id="10" name="Title 9"/>
+          <p:cNvSpPr>
+            <a:spLocks noGrp="1"/>
+          </p:cNvSpPr>
+          <p:nvPr>
+            <p:ph type="title"/>
+          </p:nvPr>
+        </p:nvSpPr>
+        <p:spPr/>
+        <p:txBody>
+          <a:bodyPr/>
+          <a:lstStyle/>
+          <a:p>
+            <a:r>
+              <a:rPr lang="en-US"/>
+              <a:t>Click to edit Master title style</a:t>
+            </a:r>
+            <a:endParaRPr lang="en-US" dirty="0"/>
+          </a:p>
+        </p:txBody>
+      </p:sp>
     </p:spTree>
     <p:extLst>
       <p:ext uri="{BB962C8B-B14F-4D97-AF65-F5344CB8AC3E}">
-        <p14:creationId xmlns:p14="http://schemas.microsoft.com/office/powerpoint/2010/main" val="839471241"/>
+        <p14:creationId xmlns:p14="http://schemas.microsoft.com/office/powerpoint/2010/main" val="1717246526"/>
       </p:ext>
     </p:extLst>
   </p:cSld>
@@ -1723,7 +1795,7 @@
           <a:p>
             <a:fld id="{D467A5D1-AEE8-4769-967D-BA49E042033D}" type="datetimeFigureOut">
               <a:rPr lang="en-US" smtClean="0"/>
-              <a:t>7/7/2017</a:t>
+              <a:t>7/19/17</a:t>
             </a:fld>
             <a:endParaRPr lang="en-US"/>
           </a:p>
@@ -1774,7 +1846,7 @@
     </p:spTree>
     <p:extLst>
       <p:ext uri="{BB962C8B-B14F-4D97-AF65-F5344CB8AC3E}">
-        <p14:creationId xmlns:p14="http://schemas.microsoft.com/office/powerpoint/2010/main" val="3790102254"/>
+        <p14:creationId xmlns:p14="http://schemas.microsoft.com/office/powerpoint/2010/main" val="1729630449"/>
       </p:ext>
     </p:extLst>
   </p:cSld>
@@ -1818,7 +1890,7 @@
           <a:p>
             <a:fld id="{D467A5D1-AEE8-4769-967D-BA49E042033D}" type="datetimeFigureOut">
               <a:rPr lang="en-US" smtClean="0"/>
-              <a:t>7/7/2017</a:t>
+              <a:t>7/19/17</a:t>
             </a:fld>
             <a:endParaRPr lang="en-US"/>
           </a:p>
@@ -1869,7 +1941,7 @@
     </p:spTree>
     <p:extLst>
       <p:ext uri="{BB962C8B-B14F-4D97-AF65-F5344CB8AC3E}">
-        <p14:creationId xmlns:p14="http://schemas.microsoft.com/office/powerpoint/2010/main" val="2450932619"/>
+        <p14:creationId xmlns:p14="http://schemas.microsoft.com/office/powerpoint/2010/main" val="1560310551"/>
       </p:ext>
     </p:extLst>
   </p:cSld>
@@ -1898,6 +1970,44 @@
       </p:grpSpPr>
       <p:sp>
         <p:nvSpPr>
+          <p:cNvPr id="26" name="Rectangle 25"/>
+          <p:cNvSpPr/>
+          <p:nvPr/>
+        </p:nvSpPr>
+        <p:spPr>
+          <a:xfrm>
+            <a:off x="0" y="0"/>
+            <a:ext cx="15120144" cy="42479913"/>
+          </a:xfrm>
+          <a:prstGeom prst="rect">
+            <a:avLst/>
+          </a:prstGeom>
+          <a:solidFill>
+            <a:schemeClr val="accent2"/>
+          </a:solidFill>
+          <a:ln>
+            <a:noFill/>
+          </a:ln>
+        </p:spPr>
+        <p:style>
+          <a:lnRef idx="2">
+            <a:schemeClr val="accent1">
+              <a:shade val="50000"/>
+            </a:schemeClr>
+          </a:lnRef>
+          <a:fillRef idx="1">
+            <a:schemeClr val="accent1"/>
+          </a:fillRef>
+          <a:effectRef idx="0">
+            <a:schemeClr val="accent1"/>
+          </a:effectRef>
+          <a:fontRef idx="minor">
+            <a:schemeClr val="lt1"/>
+          </a:fontRef>
+        </p:style>
+      </p:sp>
+      <p:sp>
+        <p:nvSpPr>
           <p:cNvPr id="2" name="Title 1"/>
           <p:cNvSpPr>
             <a:spLocks noGrp="1"/>
@@ -1908,15 +2018,29 @@
         </p:nvSpPr>
         <p:spPr>
           <a:xfrm>
-            <a:off x="2082959" y="2831994"/>
-            <a:ext cx="9753280" cy="9911980"/>
-          </a:xfrm>
-        </p:spPr>
-        <p:txBody>
-          <a:bodyPr anchor="b"/>
+            <a:off x="2118881" y="13898758"/>
+            <a:ext cx="10882383" cy="7070676"/>
+          </a:xfrm>
+          <a:solidFill>
+            <a:srgbClr val="FFFFFF"/>
+          </a:solidFill>
+          <a:ln>
+            <a:solidFill>
+              <a:srgbClr val="404040"/>
+            </a:solidFill>
+          </a:ln>
+        </p:spPr>
+        <p:txBody>
+          <a:bodyPr anchor="ctr" anchorCtr="1">
+            <a:normAutofit/>
+          </a:bodyPr>
           <a:lstStyle>
             <a:lvl1pPr>
-              <a:defRPr sz="10583"/>
+              <a:defRPr sz="6945">
+                <a:solidFill>
+                  <a:srgbClr val="262626"/>
+                </a:solidFill>
+              </a:defRPr>
             </a:lvl1pPr>
           </a:lstStyle>
           <a:p>
@@ -1940,46 +2064,68 @@
         </p:nvSpPr>
         <p:spPr>
           <a:xfrm>
-            <a:off x="12856061" y="6116330"/>
-            <a:ext cx="15309146" cy="30188272"/>
-          </a:xfrm>
-        </p:spPr>
-        <p:txBody>
-          <a:bodyPr/>
+            <a:off x="16707759" y="4984310"/>
+            <a:ext cx="11944914" cy="32511293"/>
+          </a:xfrm>
+        </p:spPr>
+        <p:txBody>
+          <a:bodyPr>
+            <a:normAutofit/>
+          </a:bodyPr>
           <a:lstStyle>
             <a:lvl1pPr>
-              <a:defRPr sz="10583"/>
+              <a:defRPr sz="6283">
+                <a:solidFill>
+                  <a:schemeClr val="tx1"/>
+                </a:solidFill>
+              </a:defRPr>
             </a:lvl1pPr>
             <a:lvl2pPr>
-              <a:defRPr sz="9260"/>
+              <a:defRPr sz="5291">
+                <a:solidFill>
+                  <a:schemeClr val="tx1"/>
+                </a:solidFill>
+              </a:defRPr>
             </a:lvl2pPr>
             <a:lvl3pPr>
-              <a:defRPr sz="7937"/>
+              <a:defRPr sz="5291">
+                <a:solidFill>
+                  <a:schemeClr val="tx1"/>
+                </a:solidFill>
+              </a:defRPr>
             </a:lvl3pPr>
             <a:lvl4pPr>
-              <a:defRPr sz="6614"/>
+              <a:defRPr sz="5291">
+                <a:solidFill>
+                  <a:schemeClr val="tx1"/>
+                </a:solidFill>
+              </a:defRPr>
             </a:lvl4pPr>
             <a:lvl5pPr>
-              <a:defRPr sz="6614"/>
+              <a:defRPr sz="5291">
+                <a:solidFill>
+                  <a:schemeClr val="tx1"/>
+                </a:solidFill>
+              </a:defRPr>
             </a:lvl5pPr>
             <a:lvl6pPr>
-              <a:defRPr sz="6614"/>
+              <a:defRPr sz="5291"/>
             </a:lvl6pPr>
             <a:lvl7pPr>
-              <a:defRPr sz="6614"/>
+              <a:defRPr sz="5291"/>
             </a:lvl7pPr>
             <a:lvl8pPr>
-              <a:defRPr sz="6614"/>
+              <a:defRPr sz="5291"/>
             </a:lvl8pPr>
             <a:lvl9pPr>
-              <a:defRPr sz="6614"/>
+              <a:defRPr sz="5291"/>
             </a:lvl9pPr>
           </a:lstStyle>
           <a:p>
             <a:pPr lvl="0"/>
             <a:r>
               <a:rPr lang="en-US"/>
-              <a:t>Edit Master text styles</a:t>
+              <a:t>Click to edit Master text styles</a:t>
             </a:r>
           </a:p>
           <a:p>
@@ -2025,16 +2171,22 @@
         </p:nvSpPr>
         <p:spPr>
           <a:xfrm>
-            <a:off x="2082959" y="12743974"/>
-            <a:ext cx="9753280" cy="23609788"/>
-          </a:xfrm>
-        </p:spPr>
-        <p:txBody>
-          <a:bodyPr/>
+            <a:off x="2853927" y="21988949"/>
+            <a:ext cx="9412290" cy="13590326"/>
+          </a:xfrm>
+        </p:spPr>
+        <p:txBody>
+          <a:bodyPr anchor="t" anchorCtr="1">
+            <a:normAutofit/>
+          </a:bodyPr>
           <a:lstStyle>
-            <a:lvl1pPr marL="0" indent="0">
-              <a:buNone/>
-              <a:defRPr sz="5291"/>
+            <a:lvl1pPr marL="0" indent="0" algn="ctr">
+              <a:buNone/>
+              <a:defRPr sz="4961">
+                <a:solidFill>
+                  <a:srgbClr val="FFFFFF"/>
+                </a:solidFill>
+              </a:defRPr>
             </a:lvl1pPr>
             <a:lvl2pPr marL="1512006" indent="0">
               <a:buNone/>
@@ -2073,14 +2225,14 @@
             <a:pPr lvl="0"/>
             <a:r>
               <a:rPr lang="en-US"/>
-              <a:t>Edit Master text styles</a:t>
-            </a:r>
-          </a:p>
-        </p:txBody>
-      </p:sp>
-      <p:sp>
-        <p:nvSpPr>
-          <p:cNvPr id="5" name="Date Placeholder 4"/>
+              <a:t>Click to edit Master text styles</a:t>
+            </a:r>
+          </a:p>
+        </p:txBody>
+      </p:sp>
+      <p:sp>
+        <p:nvSpPr>
+          <p:cNvPr id="9" name="Date Placeholder 8"/>
           <p:cNvSpPr>
             <a:spLocks noGrp="1"/>
           </p:cNvSpPr>
@@ -2095,7 +2247,7 @@
           <a:p>
             <a:fld id="{D467A5D1-AEE8-4769-967D-BA49E042033D}" type="datetimeFigureOut">
               <a:rPr lang="en-US" smtClean="0"/>
-              <a:t>7/7/2017</a:t>
+              <a:t>7/19/17</a:t>
             </a:fld>
             <a:endParaRPr lang="en-US"/>
           </a:p>
@@ -2103,7 +2255,7 @@
       </p:sp>
       <p:sp>
         <p:nvSpPr>
-          <p:cNvPr id="6" name="Footer Placeholder 5"/>
+          <p:cNvPr id="10" name="Footer Placeholder 9"/>
           <p:cNvSpPr>
             <a:spLocks noGrp="1"/>
           </p:cNvSpPr>
@@ -2111,10 +2263,27 @@
             <p:ph type="ftr" sz="quarter" idx="11"/>
           </p:nvPr>
         </p:nvSpPr>
-        <p:spPr/>
-        <p:txBody>
-          <a:bodyPr/>
-          <a:lstStyle/>
+        <p:spPr>
+          <a:xfrm>
+            <a:off x="2118880" y="38628401"/>
+            <a:ext cx="12588208" cy="1982396"/>
+          </a:xfrm>
+        </p:spPr>
+        <p:txBody>
+          <a:bodyPr>
+            <a:normAutofit/>
+          </a:bodyPr>
+          <a:lstStyle>
+            <a:lvl1pPr>
+              <a:defRPr>
+                <a:solidFill>
+                  <a:srgbClr val="FFFFFF">
+                    <a:alpha val="70000"/>
+                  </a:srgbClr>
+                </a:solidFill>
+              </a:defRPr>
+            </a:lvl1pPr>
+          </a:lstStyle>
           <a:p>
             <a:endParaRPr lang="en-US"/>
           </a:p>
@@ -2122,7 +2291,7 @@
       </p:sp>
       <p:sp>
         <p:nvSpPr>
-          <p:cNvPr id="7" name="Slide Number Placeholder 6"/>
+          <p:cNvPr id="11" name="Slide Number Placeholder 10"/>
           <p:cNvSpPr>
             <a:spLocks noGrp="1"/>
           </p:cNvSpPr>
@@ -2146,7 +2315,7 @@
     </p:spTree>
     <p:extLst>
       <p:ext uri="{BB962C8B-B14F-4D97-AF65-F5344CB8AC3E}">
-        <p14:creationId xmlns:p14="http://schemas.microsoft.com/office/powerpoint/2010/main" val="3596166776"/>
+        <p14:creationId xmlns:p14="http://schemas.microsoft.com/office/powerpoint/2010/main" val="1216617140"/>
       </p:ext>
     </p:extLst>
   </p:cSld>
@@ -2175,6 +2344,44 @@
       </p:grpSpPr>
       <p:sp>
         <p:nvSpPr>
+          <p:cNvPr id="11" name="Rectangle 10"/>
+          <p:cNvSpPr/>
+          <p:nvPr/>
+        </p:nvSpPr>
+        <p:spPr>
+          <a:xfrm>
+            <a:off x="0" y="0"/>
+            <a:ext cx="15120144" cy="42479913"/>
+          </a:xfrm>
+          <a:prstGeom prst="rect">
+            <a:avLst/>
+          </a:prstGeom>
+          <a:solidFill>
+            <a:schemeClr val="accent2"/>
+          </a:solidFill>
+          <a:ln>
+            <a:noFill/>
+          </a:ln>
+        </p:spPr>
+        <p:style>
+          <a:lnRef idx="2">
+            <a:schemeClr val="accent1">
+              <a:shade val="50000"/>
+            </a:schemeClr>
+          </a:lnRef>
+          <a:fillRef idx="1">
+            <a:schemeClr val="accent1"/>
+          </a:fillRef>
+          <a:effectRef idx="0">
+            <a:schemeClr val="accent1"/>
+          </a:effectRef>
+          <a:fontRef idx="minor">
+            <a:schemeClr val="lt1"/>
+          </a:fontRef>
+        </p:style>
+      </p:sp>
+      <p:sp>
+        <p:nvSpPr>
           <p:cNvPr id="2" name="Title 1"/>
           <p:cNvSpPr>
             <a:spLocks noGrp="1"/>
@@ -2185,15 +2392,29 @@
         </p:nvSpPr>
         <p:spPr>
           <a:xfrm>
-            <a:off x="2082959" y="2831994"/>
-            <a:ext cx="9753280" cy="9911980"/>
-          </a:xfrm>
-        </p:spPr>
-        <p:txBody>
-          <a:bodyPr anchor="b"/>
+            <a:off x="2116820" y="13898748"/>
+            <a:ext cx="10886504" cy="7079986"/>
+          </a:xfrm>
+          <a:solidFill>
+            <a:srgbClr val="FFFFFF"/>
+          </a:solidFill>
+          <a:ln>
+            <a:solidFill>
+              <a:srgbClr val="262626"/>
+            </a:solidFill>
+          </a:ln>
+        </p:spPr>
+        <p:txBody>
+          <a:bodyPr anchor="ctr" anchorCtr="1">
+            <a:noAutofit/>
+          </a:bodyPr>
           <a:lstStyle>
             <a:lvl1pPr>
-              <a:defRPr sz="10583"/>
+              <a:defRPr sz="6945">
+                <a:solidFill>
+                  <a:srgbClr val="262626"/>
+                </a:solidFill>
+              </a:defRPr>
             </a:lvl1pPr>
           </a:lstStyle>
           <a:p>
@@ -2217,16 +2438,23 @@
         </p:nvSpPr>
         <p:spPr>
           <a:xfrm>
-            <a:off x="12856061" y="6116330"/>
-            <a:ext cx="15309146" cy="30188272"/>
-          </a:xfrm>
+            <a:off x="15120146" y="0"/>
+            <a:ext cx="15135267" cy="42479913"/>
+          </a:xfrm>
+          <a:solidFill>
+            <a:schemeClr val="bg1"/>
+          </a:solidFill>
         </p:spPr>
         <p:txBody>
           <a:bodyPr anchor="t"/>
           <a:lstStyle>
             <a:lvl1pPr marL="0" indent="0">
               <a:buNone/>
-              <a:defRPr sz="10583"/>
+              <a:defRPr sz="10583">
+                <a:solidFill>
+                  <a:schemeClr val="tx1"/>
+                </a:solidFill>
+              </a:defRPr>
             </a:lvl1pPr>
             <a:lvl2pPr marL="1512006" indent="0">
               <a:buNone/>
@@ -2264,7 +2492,7 @@
           <a:p>
             <a:r>
               <a:rPr lang="en-US"/>
-              <a:t>Click icon to add picture</a:t>
+              <a:t>Drag picture to placeholder or click icon to add</a:t>
             </a:r>
             <a:endParaRPr lang="en-US" dirty="0"/>
           </a:p>
@@ -2282,16 +2510,22 @@
         </p:nvSpPr>
         <p:spPr>
           <a:xfrm>
-            <a:off x="2082959" y="12743974"/>
-            <a:ext cx="9753280" cy="23609788"/>
-          </a:xfrm>
-        </p:spPr>
-        <p:txBody>
-          <a:bodyPr/>
+            <a:off x="2853927" y="21988957"/>
+            <a:ext cx="9412290" cy="13590333"/>
+          </a:xfrm>
+        </p:spPr>
+        <p:txBody>
+          <a:bodyPr anchor="t" anchorCtr="1">
+            <a:normAutofit/>
+          </a:bodyPr>
           <a:lstStyle>
-            <a:lvl1pPr marL="0" indent="0">
-              <a:buNone/>
-              <a:defRPr sz="5291"/>
+            <a:lvl1pPr marL="0" indent="0" algn="ctr">
+              <a:buNone/>
+              <a:defRPr sz="4961">
+                <a:solidFill>
+                  <a:srgbClr val="FFFFFF"/>
+                </a:solidFill>
+              </a:defRPr>
             </a:lvl1pPr>
             <a:lvl2pPr marL="1512006" indent="0">
               <a:buNone/>
@@ -2330,14 +2564,14 @@
             <a:pPr lvl="0"/>
             <a:r>
               <a:rPr lang="en-US"/>
-              <a:t>Edit Master text styles</a:t>
-            </a:r>
-          </a:p>
-        </p:txBody>
-      </p:sp>
-      <p:sp>
-        <p:nvSpPr>
-          <p:cNvPr id="5" name="Date Placeholder 4"/>
+              <a:t>Click to edit Master text styles</a:t>
+            </a:r>
+          </a:p>
+        </p:txBody>
+      </p:sp>
+      <p:sp>
+        <p:nvSpPr>
+          <p:cNvPr id="8" name="Date Placeholder 7"/>
           <p:cNvSpPr>
             <a:spLocks noGrp="1"/>
           </p:cNvSpPr>
@@ -2348,11 +2582,26 @@
         <p:spPr/>
         <p:txBody>
           <a:bodyPr/>
-          <a:lstStyle/>
+          <a:lstStyle>
+            <a:lvl1pPr>
+              <a:defRPr>
+                <a:solidFill>
+                  <a:srgbClr val="FFFFFF"/>
+                </a:solidFill>
+                <a:effectLst>
+                  <a:outerShdw blurRad="50800" dist="38100" dir="2700000" algn="tl" rotWithShape="0">
+                    <a:prstClr val="black">
+                      <a:alpha val="43000"/>
+                    </a:prstClr>
+                  </a:outerShdw>
+                </a:effectLst>
+              </a:defRPr>
+            </a:lvl1pPr>
+          </a:lstStyle>
           <a:p>
             <a:fld id="{D467A5D1-AEE8-4769-967D-BA49E042033D}" type="datetimeFigureOut">
               <a:rPr lang="en-US" smtClean="0"/>
-              <a:t>7/7/2017</a:t>
+              <a:t>7/19/17</a:t>
             </a:fld>
             <a:endParaRPr lang="en-US"/>
           </a:p>
@@ -2360,7 +2609,7 @@
       </p:sp>
       <p:sp>
         <p:nvSpPr>
-          <p:cNvPr id="6" name="Footer Placeholder 5"/>
+          <p:cNvPr id="9" name="Footer Placeholder 8"/>
           <p:cNvSpPr>
             <a:spLocks noGrp="1"/>
           </p:cNvSpPr>
@@ -2368,10 +2617,27 @@
             <p:ph type="ftr" sz="quarter" idx="11"/>
           </p:nvPr>
         </p:nvSpPr>
-        <p:spPr/>
-        <p:txBody>
-          <a:bodyPr/>
-          <a:lstStyle/>
+        <p:spPr>
+          <a:xfrm>
+            <a:off x="2116820" y="38628401"/>
+            <a:ext cx="12579960" cy="1982396"/>
+          </a:xfrm>
+        </p:spPr>
+        <p:txBody>
+          <a:bodyPr>
+            <a:normAutofit/>
+          </a:bodyPr>
+          <a:lstStyle>
+            <a:lvl1pPr>
+              <a:defRPr>
+                <a:solidFill>
+                  <a:srgbClr val="FFFFFF">
+                    <a:alpha val="70000"/>
+                  </a:srgbClr>
+                </a:solidFill>
+              </a:defRPr>
+            </a:lvl1pPr>
+          </a:lstStyle>
           <a:p>
             <a:endParaRPr lang="en-US"/>
           </a:p>
@@ -2379,7 +2645,7 @@
       </p:sp>
       <p:sp>
         <p:nvSpPr>
-          <p:cNvPr id="7" name="Slide Number Placeholder 6"/>
+          <p:cNvPr id="10" name="Slide Number Placeholder 9"/>
           <p:cNvSpPr>
             <a:spLocks noGrp="1"/>
           </p:cNvSpPr>
@@ -2403,7 +2669,7 @@
     </p:spTree>
     <p:extLst>
       <p:ext uri="{BB962C8B-B14F-4D97-AF65-F5344CB8AC3E}">
-        <p14:creationId xmlns:p14="http://schemas.microsoft.com/office/powerpoint/2010/main" val="1526568273"/>
+        <p14:creationId xmlns:p14="http://schemas.microsoft.com/office/powerpoint/2010/main" val="1492468893"/>
       </p:ext>
     </p:extLst>
   </p:cSld>
@@ -2418,7 +2684,7 @@
   <p:cSld>
     <p:bg>
       <p:bgRef idx="1001">
-        <a:schemeClr val="bg1"/>
+        <a:schemeClr val="bg2"/>
       </p:bgRef>
     </p:bg>
     <p:spTree>
@@ -2447,15 +2713,27 @@
         </p:nvSpPr>
         <p:spPr>
           <a:xfrm>
-            <a:off x="2079020" y="2261671"/>
-            <a:ext cx="26082248" cy="8210820"/>
+            <a:off x="5311382" y="5975508"/>
+            <a:ext cx="19636857" cy="7363185"/>
           </a:xfrm>
           <a:prstGeom prst="rect">
             <a:avLst/>
           </a:prstGeom>
-        </p:spPr>
-        <p:txBody>
-          <a:bodyPr vert="horz" lIns="91440" tIns="45720" rIns="91440" bIns="45720" rtlCol="0" anchor="ctr">
+          <a:solidFill>
+            <a:schemeClr val="bg1"/>
+          </a:solidFill>
+          <a:ln w="31750" cap="sq">
+            <a:solidFill>
+              <a:schemeClr val="tx1">
+                <a:lumMod val="75000"/>
+                <a:lumOff val="25000"/>
+              </a:schemeClr>
+            </a:solidFill>
+            <a:miter lim="800000"/>
+          </a:ln>
+        </p:spPr>
+        <p:txBody>
+          <a:bodyPr vert="horz" lIns="182880" tIns="182880" rIns="182880" bIns="182880" rtlCol="0" anchor="ctr">
             <a:normAutofit/>
           </a:bodyPr>
           <a:lstStyle/>
@@ -2480,8 +2758,8 @@
         </p:nvSpPr>
         <p:spPr>
           <a:xfrm>
-            <a:off x="2079020" y="11308310"/>
-            <a:ext cx="26082248" cy="26953115"/>
+            <a:off x="5311382" y="16340616"/>
+            <a:ext cx="19636857" cy="19214344"/>
           </a:xfrm>
           <a:prstGeom prst="rect">
             <a:avLst/>
@@ -2495,38 +2773,37 @@
           <a:p>
             <a:pPr lvl="0"/>
             <a:r>
-              <a:rPr lang="en-US"/>
+              <a:rPr lang="en-US" dirty="0"/>
               <a:t>Edit Master text styles</a:t>
             </a:r>
           </a:p>
           <a:p>
             <a:pPr lvl="1"/>
             <a:r>
-              <a:rPr lang="en-US"/>
+              <a:rPr lang="en-US" dirty="0"/>
               <a:t>Second level</a:t>
             </a:r>
           </a:p>
           <a:p>
             <a:pPr lvl="2"/>
             <a:r>
-              <a:rPr lang="en-US"/>
+              <a:rPr lang="en-US" dirty="0"/>
               <a:t>Third level</a:t>
             </a:r>
           </a:p>
           <a:p>
             <a:pPr lvl="3"/>
             <a:r>
-              <a:rPr lang="en-US"/>
+              <a:rPr lang="en-US" dirty="0"/>
               <a:t>Fourth level</a:t>
             </a:r>
           </a:p>
           <a:p>
             <a:pPr lvl="4"/>
             <a:r>
-              <a:rPr lang="en-US"/>
+              <a:rPr lang="en-US" dirty="0"/>
               <a:t>Fifth level</a:t>
             </a:r>
-            <a:endParaRPr lang="en-US" dirty="0"/>
           </a:p>
         </p:txBody>
       </p:sp>
@@ -2542,8 +2819,8 @@
         </p:nvSpPr>
         <p:spPr>
           <a:xfrm>
-            <a:off x="2079020" y="39372595"/>
-            <a:ext cx="6804065" cy="2261662"/>
+            <a:off x="19773071" y="38644555"/>
+            <a:ext cx="6830224" cy="2006727"/>
           </a:xfrm>
           <a:prstGeom prst="rect">
             <a:avLst/>
@@ -2552,11 +2829,11 @@
         <p:txBody>
           <a:bodyPr vert="horz" lIns="91440" tIns="45720" rIns="91440" bIns="45720" rtlCol="0" anchor="ctr"/>
           <a:lstStyle>
-            <a:lvl1pPr algn="l">
-              <a:defRPr sz="3969">
+            <a:lvl1pPr algn="r">
+              <a:defRPr sz="3307">
                 <a:solidFill>
                   <a:schemeClr val="tx1">
-                    <a:tint val="75000"/>
+                    <a:alpha val="70000"/>
                   </a:schemeClr>
                 </a:solidFill>
               </a:defRPr>
@@ -2565,7 +2842,7 @@
           <a:p>
             <a:fld id="{D467A5D1-AEE8-4769-967D-BA49E042033D}" type="datetimeFigureOut">
               <a:rPr lang="en-US" smtClean="0"/>
-              <a:t>7/7/2017</a:t>
+              <a:t>7/19/17</a:t>
             </a:fld>
             <a:endParaRPr lang="en-US"/>
           </a:p>
@@ -2583,8 +2860,8 @@
         </p:nvSpPr>
         <p:spPr>
           <a:xfrm>
-            <a:off x="10017096" y="39372595"/>
-            <a:ext cx="10206097" cy="2261662"/>
+            <a:off x="3645235" y="38628401"/>
+            <a:ext cx="15069426" cy="1982396"/>
           </a:xfrm>
           <a:prstGeom prst="rect">
             <a:avLst/>
@@ -2593,11 +2870,11 @@
         <p:txBody>
           <a:bodyPr vert="horz" lIns="91440" tIns="45720" rIns="91440" bIns="45720" rtlCol="0" anchor="ctr"/>
           <a:lstStyle>
-            <a:lvl1pPr algn="ctr">
-              <a:defRPr sz="3969">
+            <a:lvl1pPr algn="l">
+              <a:defRPr sz="3307">
                 <a:solidFill>
                   <a:schemeClr val="tx1">
-                    <a:tint val="75000"/>
+                    <a:alpha val="70000"/>
                   </a:schemeClr>
                 </a:solidFill>
               </a:defRPr>
@@ -2620,22 +2897,27 @@
         </p:nvSpPr>
         <p:spPr>
           <a:xfrm>
-            <a:off x="21357203" y="39372595"/>
-            <a:ext cx="6804065" cy="2261662"/>
-          </a:xfrm>
-          <a:prstGeom prst="rect">
+            <a:off x="27251023" y="38515121"/>
+            <a:ext cx="1209612" cy="2265595"/>
+          </a:xfrm>
+          <a:prstGeom prst="ellipse">
             <a:avLst/>
           </a:prstGeom>
-        </p:spPr>
-        <p:txBody>
-          <a:bodyPr vert="horz" lIns="91440" tIns="45720" rIns="91440" bIns="45720" rtlCol="0" anchor="ctr"/>
+          <a:solidFill>
+            <a:srgbClr val="1D1D1D">
+              <a:alpha val="69804"/>
+            </a:srgbClr>
+          </a:solidFill>
+        </p:spPr>
+        <p:txBody>
+          <a:bodyPr vert="horz" lIns="18288" tIns="45720" rIns="18288" bIns="45720" rtlCol="0" anchor="ctr">
+            <a:noAutofit/>
+          </a:bodyPr>
           <a:lstStyle>
-            <a:lvl1pPr algn="r">
-              <a:defRPr sz="3969">
-                <a:solidFill>
-                  <a:schemeClr val="tx1">
-                    <a:tint val="75000"/>
-                  </a:schemeClr>
+            <a:lvl1pPr algn="ctr">
+              <a:defRPr sz="3638" spc="0" baseline="0">
+                <a:solidFill>
+                  <a:srgbClr val="FFFFFF"/>
                 </a:solidFill>
               </a:defRPr>
             </a:lvl1pPr>
@@ -2652,27 +2934,27 @@
     </p:spTree>
     <p:extLst>
       <p:ext uri="{BB962C8B-B14F-4D97-AF65-F5344CB8AC3E}">
-        <p14:creationId xmlns:p14="http://schemas.microsoft.com/office/powerpoint/2010/main" val="2585753842"/>
+        <p14:creationId xmlns:p14="http://schemas.microsoft.com/office/powerpoint/2010/main" val="957173240"/>
       </p:ext>
     </p:extLst>
   </p:cSld>
   <p:clrMap bg1="lt1" tx1="dk1" bg2="lt2" tx2="dk2" accent1="accent1" accent2="accent2" accent3="accent3" accent4="accent4" accent5="accent5" accent6="accent6" hlink="hlink" folHlink="folHlink"/>
   <p:sldLayoutIdLst>
-    <p:sldLayoutId id="2147483661" r:id="rId1"/>
-    <p:sldLayoutId id="2147483662" r:id="rId2"/>
-    <p:sldLayoutId id="2147483663" r:id="rId3"/>
-    <p:sldLayoutId id="2147483664" r:id="rId4"/>
-    <p:sldLayoutId id="2147483665" r:id="rId5"/>
-    <p:sldLayoutId id="2147483666" r:id="rId6"/>
-    <p:sldLayoutId id="2147483667" r:id="rId7"/>
-    <p:sldLayoutId id="2147483668" r:id="rId8"/>
-    <p:sldLayoutId id="2147483669" r:id="rId9"/>
-    <p:sldLayoutId id="2147483670" r:id="rId10"/>
-    <p:sldLayoutId id="2147483671" r:id="rId11"/>
+    <p:sldLayoutId id="2147483745" r:id="rId1"/>
+    <p:sldLayoutId id="2147483746" r:id="rId2"/>
+    <p:sldLayoutId id="2147483747" r:id="rId3"/>
+    <p:sldLayoutId id="2147483748" r:id="rId4"/>
+    <p:sldLayoutId id="2147483749" r:id="rId5"/>
+    <p:sldLayoutId id="2147483750" r:id="rId6"/>
+    <p:sldLayoutId id="2147483751" r:id="rId7"/>
+    <p:sldLayoutId id="2147483752" r:id="rId8"/>
+    <p:sldLayoutId id="2147483753" r:id="rId9"/>
+    <p:sldLayoutId id="2147483754" r:id="rId10"/>
+    <p:sldLayoutId id="2147483755" r:id="rId11"/>
   </p:sldLayoutIdLst>
   <p:txStyles>
     <p:titleStyle>
-      <a:lvl1pPr algn="l" defTabSz="3024012" rtl="0" eaLnBrk="1" latinLnBrk="0" hangingPunct="1">
+      <a:lvl1pPr algn="ctr" defTabSz="3024012" rtl="0" eaLnBrk="1" latinLnBrk="0" hangingPunct="1">
         <a:lnSpc>
           <a:spcPct val="90000"/>
         </a:lnSpc>
@@ -2680,9 +2962,12 @@
           <a:spcPct val="0"/>
         </a:spcBef>
         <a:buNone/>
-        <a:defRPr sz="14551" kern="1200">
+        <a:defRPr sz="8598" kern="1200" cap="all" spc="661" baseline="0">
           <a:solidFill>
-            <a:schemeClr val="tx1"/>
+            <a:schemeClr val="tx1">
+              <a:lumMod val="85000"/>
+              <a:lumOff val="15000"/>
+            </a:schemeClr>
           </a:solidFill>
           <a:latin typeface="+mj-lt"/>
           <a:ea typeface="+mj-ea"/>
@@ -2693,104 +2978,137 @@
     <p:bodyStyle>
       <a:lvl1pPr marL="756003" indent="-756003" algn="l" defTabSz="3024012" rtl="0" eaLnBrk="1" latinLnBrk="0" hangingPunct="1">
         <a:lnSpc>
-          <a:spcPct val="90000"/>
+          <a:spcPct val="100000"/>
         </a:lnSpc>
         <a:spcBef>
           <a:spcPts val="3307"/>
         </a:spcBef>
+        <a:buClr>
+          <a:schemeClr val="accent2"/>
+        </a:buClr>
         <a:buFont typeface="Arial" panose="020B0604020202020204" pitchFamily="34" charset="0"/>
         <a:buChar char="•"/>
-        <a:defRPr sz="9260" kern="1200">
+        <a:defRPr sz="5953" kern="1200">
           <a:solidFill>
-            <a:schemeClr val="tx1"/>
+            <a:schemeClr val="tx1">
+              <a:lumMod val="85000"/>
+              <a:lumOff val="15000"/>
+            </a:schemeClr>
           </a:solidFill>
           <a:latin typeface="+mn-lt"/>
           <a:ea typeface="+mn-ea"/>
           <a:cs typeface="+mn-cs"/>
         </a:defRPr>
       </a:lvl1pPr>
-      <a:lvl2pPr marL="2268009" indent="-756003" algn="l" defTabSz="3024012" rtl="0" eaLnBrk="1" latinLnBrk="0" hangingPunct="1">
+      <a:lvl2pPr marL="1512006" indent="-756003" algn="l" defTabSz="3024012" rtl="0" eaLnBrk="1" latinLnBrk="0" hangingPunct="1">
         <a:lnSpc>
-          <a:spcPct val="90000"/>
+          <a:spcPct val="100000"/>
         </a:lnSpc>
         <a:spcBef>
-          <a:spcPts val="1654"/>
+          <a:spcPts val="3307"/>
         </a:spcBef>
+        <a:buClr>
+          <a:schemeClr val="accent2"/>
+        </a:buClr>
         <a:buFont typeface="Arial" panose="020B0604020202020204" pitchFamily="34" charset="0"/>
         <a:buChar char="•"/>
-        <a:defRPr sz="7937" kern="1200">
+        <a:defRPr sz="5291" kern="1200">
           <a:solidFill>
-            <a:schemeClr val="tx1"/>
+            <a:schemeClr val="tx1">
+              <a:lumMod val="85000"/>
+              <a:lumOff val="15000"/>
+            </a:schemeClr>
           </a:solidFill>
           <a:latin typeface="+mn-lt"/>
           <a:ea typeface="+mn-ea"/>
           <a:cs typeface="+mn-cs"/>
         </a:defRPr>
       </a:lvl2pPr>
-      <a:lvl3pPr marL="3780015" indent="-756003" algn="l" defTabSz="3024012" rtl="0" eaLnBrk="1" latinLnBrk="0" hangingPunct="1">
+      <a:lvl3pPr marL="2268009" indent="-756003" algn="l" defTabSz="3024012" rtl="0" eaLnBrk="1" latinLnBrk="0" hangingPunct="1">
         <a:lnSpc>
-          <a:spcPct val="90000"/>
+          <a:spcPct val="100000"/>
         </a:lnSpc>
         <a:spcBef>
-          <a:spcPts val="1654"/>
+          <a:spcPts val="3307"/>
         </a:spcBef>
+        <a:buClr>
+          <a:schemeClr val="accent2"/>
+        </a:buClr>
         <a:buFont typeface="Arial" panose="020B0604020202020204" pitchFamily="34" charset="0"/>
         <a:buChar char="•"/>
-        <a:defRPr sz="6614" kern="1200">
+        <a:defRPr sz="5291" kern="1200">
           <a:solidFill>
-            <a:schemeClr val="tx1"/>
+            <a:schemeClr val="tx1">
+              <a:lumMod val="85000"/>
+              <a:lumOff val="15000"/>
+            </a:schemeClr>
           </a:solidFill>
           <a:latin typeface="+mn-lt"/>
           <a:ea typeface="+mn-ea"/>
           <a:cs typeface="+mn-cs"/>
         </a:defRPr>
       </a:lvl3pPr>
-      <a:lvl4pPr marL="5292021" indent="-756003" algn="l" defTabSz="3024012" rtl="0" eaLnBrk="1" latinLnBrk="0" hangingPunct="1">
+      <a:lvl4pPr marL="3024012" indent="-756003" algn="l" defTabSz="3024012" rtl="0" eaLnBrk="1" latinLnBrk="0" hangingPunct="1">
         <a:lnSpc>
-          <a:spcPct val="90000"/>
+          <a:spcPct val="100000"/>
         </a:lnSpc>
         <a:spcBef>
-          <a:spcPts val="1654"/>
+          <a:spcPts val="3307"/>
         </a:spcBef>
+        <a:buClr>
+          <a:schemeClr val="accent2"/>
+        </a:buClr>
         <a:buFont typeface="Arial" panose="020B0604020202020204" pitchFamily="34" charset="0"/>
         <a:buChar char="•"/>
-        <a:defRPr sz="5953" kern="1200">
+        <a:defRPr sz="5291" kern="1200">
           <a:solidFill>
-            <a:schemeClr val="tx1"/>
+            <a:schemeClr val="tx1">
+              <a:lumMod val="85000"/>
+              <a:lumOff val="15000"/>
+            </a:schemeClr>
           </a:solidFill>
           <a:latin typeface="+mn-lt"/>
           <a:ea typeface="+mn-ea"/>
           <a:cs typeface="+mn-cs"/>
         </a:defRPr>
       </a:lvl4pPr>
-      <a:lvl5pPr marL="6804028" indent="-756003" algn="l" defTabSz="3024012" rtl="0" eaLnBrk="1" latinLnBrk="0" hangingPunct="1">
+      <a:lvl5pPr marL="3780015" indent="-756003" algn="l" defTabSz="3024012" rtl="0" eaLnBrk="1" latinLnBrk="0" hangingPunct="1">
         <a:lnSpc>
-          <a:spcPct val="90000"/>
+          <a:spcPct val="100000"/>
         </a:lnSpc>
         <a:spcBef>
-          <a:spcPts val="1654"/>
+          <a:spcPts val="3307"/>
         </a:spcBef>
+        <a:buClr>
+          <a:schemeClr val="accent2"/>
+        </a:buClr>
         <a:buFont typeface="Arial" panose="020B0604020202020204" pitchFamily="34" charset="0"/>
         <a:buChar char="•"/>
-        <a:defRPr sz="5953" kern="1200">
+        <a:defRPr sz="5291" kern="1200">
           <a:solidFill>
-            <a:schemeClr val="tx1"/>
+            <a:schemeClr val="tx1">
+              <a:lumMod val="85000"/>
+              <a:lumOff val="15000"/>
+            </a:schemeClr>
           </a:solidFill>
           <a:latin typeface="+mn-lt"/>
           <a:ea typeface="+mn-ea"/>
           <a:cs typeface="+mn-cs"/>
         </a:defRPr>
       </a:lvl5pPr>
-      <a:lvl6pPr marL="8316034" indent="-756003" algn="l" defTabSz="3024012" rtl="0" eaLnBrk="1" latinLnBrk="0" hangingPunct="1">
+      <a:lvl6pPr marL="4347018" indent="-756003" algn="l" defTabSz="3024012" rtl="0" eaLnBrk="1" latinLnBrk="0" hangingPunct="1">
         <a:lnSpc>
-          <a:spcPct val="90000"/>
+          <a:spcPct val="100000"/>
         </a:lnSpc>
         <a:spcBef>
-          <a:spcPts val="1654"/>
+          <a:spcPts val="3307"/>
         </a:spcBef>
+        <a:buClr>
+          <a:schemeClr val="accent2"/>
+        </a:buClr>
         <a:buFont typeface="Arial" panose="020B0604020202020204" pitchFamily="34" charset="0"/>
         <a:buChar char="•"/>
-        <a:defRPr sz="5953" kern="1200">
+        <a:defRPr sz="5291" kern="1200">
           <a:solidFill>
             <a:schemeClr val="tx1"/>
           </a:solidFill>
@@ -2799,16 +3117,19 @@
           <a:cs typeface="+mn-cs"/>
         </a:defRPr>
       </a:lvl6pPr>
-      <a:lvl7pPr marL="9828040" indent="-756003" algn="l" defTabSz="3024012" rtl="0" eaLnBrk="1" latinLnBrk="0" hangingPunct="1">
+      <a:lvl7pPr marL="4914020" indent="-756003" algn="l" defTabSz="3024012" rtl="0" eaLnBrk="1" latinLnBrk="0" hangingPunct="1">
         <a:lnSpc>
-          <a:spcPct val="90000"/>
+          <a:spcPct val="100000"/>
         </a:lnSpc>
         <a:spcBef>
-          <a:spcPts val="1654"/>
+          <a:spcPts val="3307"/>
         </a:spcBef>
+        <a:buClr>
+          <a:schemeClr val="accent2"/>
+        </a:buClr>
         <a:buFont typeface="Arial" panose="020B0604020202020204" pitchFamily="34" charset="0"/>
         <a:buChar char="•"/>
-        <a:defRPr sz="5953" kern="1200">
+        <a:defRPr sz="5291" kern="1200">
           <a:solidFill>
             <a:schemeClr val="tx1"/>
           </a:solidFill>
@@ -2817,16 +3138,19 @@
           <a:cs typeface="+mn-cs"/>
         </a:defRPr>
       </a:lvl7pPr>
-      <a:lvl8pPr marL="11340046" indent="-756003" algn="l" defTabSz="3024012" rtl="0" eaLnBrk="1" latinLnBrk="0" hangingPunct="1">
+      <a:lvl8pPr marL="5481022" indent="-756003" algn="l" defTabSz="3024012" rtl="0" eaLnBrk="1" latinLnBrk="0" hangingPunct="1">
         <a:lnSpc>
-          <a:spcPct val="90000"/>
+          <a:spcPct val="100000"/>
         </a:lnSpc>
         <a:spcBef>
-          <a:spcPts val="1654"/>
+          <a:spcPts val="3307"/>
         </a:spcBef>
+        <a:buClr>
+          <a:schemeClr val="accent2"/>
+        </a:buClr>
         <a:buFont typeface="Arial" panose="020B0604020202020204" pitchFamily="34" charset="0"/>
         <a:buChar char="•"/>
-        <a:defRPr sz="5953" kern="1200">
+        <a:defRPr sz="5291" kern="1200" baseline="0">
           <a:solidFill>
             <a:schemeClr val="tx1"/>
           </a:solidFill>
@@ -2835,16 +3159,19 @@
           <a:cs typeface="+mn-cs"/>
         </a:defRPr>
       </a:lvl8pPr>
-      <a:lvl9pPr marL="12852052" indent="-756003" algn="l" defTabSz="3024012" rtl="0" eaLnBrk="1" latinLnBrk="0" hangingPunct="1">
+      <a:lvl9pPr marL="6048024" indent="-756003" algn="l" defTabSz="3024012" rtl="0" eaLnBrk="1" latinLnBrk="0" hangingPunct="1">
         <a:lnSpc>
-          <a:spcPct val="90000"/>
+          <a:spcPct val="100000"/>
         </a:lnSpc>
         <a:spcBef>
-          <a:spcPts val="1654"/>
+          <a:spcPts val="3307"/>
         </a:spcBef>
+        <a:buClr>
+          <a:schemeClr val="accent2"/>
+        </a:buClr>
         <a:buFont typeface="Arial" panose="020B0604020202020204" pitchFamily="34" charset="0"/>
         <a:buChar char="•"/>
-        <a:defRPr sz="5953" kern="1200">
+        <a:defRPr sz="5291" kern="1200" baseline="0">
           <a:solidFill>
             <a:schemeClr val="tx1"/>
           </a:solidFill>
@@ -2975,7 +3302,7 @@
           <p:cNvPr id="13" name="Rectangle 12">
             <a:extLst>
               <a:ext uri="{FF2B5EF4-FFF2-40B4-BE49-F238E27FC236}">
-                <a16:creationId xmlns:a16="http://schemas.microsoft.com/office/drawing/2014/main" id="{D2B83347-8D63-4540-B682-74B5EE6EE107}"/>
+                <a16:creationId xmlns:a16="http://schemas.microsoft.com/office/drawing/2014/main" xmlns="" id="{D2B83347-8D63-4540-B682-74B5EE6EE107}"/>
               </a:ext>
             </a:extLst>
           </p:cNvPr>
@@ -2984,14 +3311,17 @@
         </p:nvSpPr>
         <p:spPr>
           <a:xfrm>
-            <a:off x="1159139" y="30586003"/>
+            <a:off x="1159139" y="30825168"/>
             <a:ext cx="13200328" cy="9444397"/>
           </a:xfrm>
           <a:prstGeom prst="rect">
             <a:avLst/>
           </a:prstGeom>
           <a:solidFill>
-            <a:srgbClr val="BCBA60"/>
+            <a:schemeClr val="accent6">
+              <a:lumMod val="60000"/>
+              <a:lumOff val="40000"/>
+            </a:schemeClr>
           </a:solidFill>
           <a:ln>
             <a:noFill/>
@@ -3027,7 +3357,7 @@
           <p:cNvPr id="4" name="Title 1">
             <a:extLst>
               <a:ext uri="{FF2B5EF4-FFF2-40B4-BE49-F238E27FC236}">
-                <a16:creationId xmlns:a16="http://schemas.microsoft.com/office/drawing/2014/main" id="{072F4FDC-BBB6-42E8-A259-31E2EFEB5702}"/>
+                <a16:creationId xmlns:a16="http://schemas.microsoft.com/office/drawing/2014/main" xmlns="" id="{072F4FDC-BBB6-42E8-A259-31E2EFEB5702}"/>
               </a:ext>
             </a:extLst>
           </p:cNvPr>
@@ -3072,17 +3402,45 @@
             <a:pPr algn="ctr"/>
             <a:r>
               <a:rPr lang="en-GB" sz="19200" cap="all" dirty="0">
+                <a:solidFill>
+                  <a:schemeClr val="accent6">
+                    <a:lumMod val="50000"/>
+                  </a:schemeClr>
+                </a:solidFill>
                 <a:latin typeface="Arial Black" panose="020B0A04020102020204" pitchFamily="34" charset="0"/>
               </a:rPr>
               <a:t>Multilingual Software Analysis</a:t>
             </a:r>
+            <a:r>
+              <a:rPr lang="en-US" b="1" cap="all" dirty="0">
+                <a:solidFill>
+                  <a:schemeClr val="accent6">
+                    <a:lumMod val="50000"/>
+                  </a:schemeClr>
+                </a:solidFill>
+                <a:latin typeface="Times New Roman" panose="02020603050405020304" pitchFamily="18" charset="0"/>
+                <a:ea typeface="Times New Roman" panose="02020603050405020304" pitchFamily="18" charset="0"/>
+              </a:rPr>
+              <a:t/>
+            </a:r>
             <a:br>
               <a:rPr lang="en-US" b="1" cap="all" dirty="0">
+                <a:solidFill>
+                  <a:schemeClr val="accent6">
+                    <a:lumMod val="50000"/>
+                  </a:schemeClr>
+                </a:solidFill>
                 <a:latin typeface="Times New Roman" panose="02020603050405020304" pitchFamily="18" charset="0"/>
                 <a:ea typeface="Times New Roman" panose="02020603050405020304" pitchFamily="18" charset="0"/>
               </a:rPr>
             </a:br>
-            <a:endParaRPr lang="en-US" dirty="0"/>
+            <a:endParaRPr lang="en-US" dirty="0">
+              <a:solidFill>
+                <a:schemeClr val="accent6">
+                  <a:lumMod val="50000"/>
+                </a:schemeClr>
+              </a:solidFill>
+            </a:endParaRPr>
           </a:p>
         </p:txBody>
       </p:sp>
@@ -3091,7 +3449,7 @@
           <p:cNvPr id="6" name="Picture 5">
             <a:extLst>
               <a:ext uri="{FF2B5EF4-FFF2-40B4-BE49-F238E27FC236}">
-                <a16:creationId xmlns:a16="http://schemas.microsoft.com/office/drawing/2014/main" id="{9D66776E-46A1-4DFF-987B-21741431313F}"/>
+                <a16:creationId xmlns:a16="http://schemas.microsoft.com/office/drawing/2014/main" xmlns="" id="{9D66776E-46A1-4DFF-987B-21741431313F}"/>
               </a:ext>
             </a:extLst>
           </p:cNvPr>
@@ -3127,7 +3485,7 @@
           <p:cNvPr id="7" name="Subtitle 2">
             <a:extLst>
               <a:ext uri="{FF2B5EF4-FFF2-40B4-BE49-F238E27FC236}">
-                <a16:creationId xmlns:a16="http://schemas.microsoft.com/office/drawing/2014/main" id="{5B704CF1-33A9-4BA5-A9FC-241E23A65920}"/>
+                <a16:creationId xmlns:a16="http://schemas.microsoft.com/office/drawing/2014/main" xmlns="" id="{5B704CF1-33A9-4BA5-A9FC-241E23A65920}"/>
               </a:ext>
             </a:extLst>
           </p:cNvPr>
@@ -3338,12 +3696,8 @@
               <a:t>1</a:t>
             </a:r>
             <a:r>
-              <a:rPr lang="en-GB" sz="6000" u="sng" dirty="0"/>
-              <a:t> </a:t>
-            </a:r>
-            <a:r>
               <a:rPr lang="en-GB" sz="6000" dirty="0"/>
-              <a:t>and David Baird</a:t>
+              <a:t> and David Baird</a:t>
             </a:r>
             <a:r>
               <a:rPr lang="en-GB" sz="6000" baseline="30000" dirty="0"/>
@@ -3357,6 +3711,10 @@
             <a:r>
               <a:rPr lang="en-GB" sz="6000" dirty="0"/>
               <a:t>MLSA Research group</a:t>
+            </a:r>
+            <a:r>
+              <a:rPr lang="en-GB" sz="4800" baseline="30000" dirty="0"/>
+              <a:t/>
             </a:r>
             <a:br>
               <a:rPr lang="en-GB" sz="4800" baseline="30000" dirty="0"/>
@@ -3414,13 +3772,7 @@
             </a:r>
             <a:r>
               <a:rPr lang="en-GB" sz="4400" dirty="0"/>
-              <a:t>}@fordham.edu, </a:t>
-            </a:r>
-            <a:r>
-              <a:rPr lang="en-GB" sz="4400" dirty="0">
-                <a:hlinkClick r:id="rId3"/>
-              </a:rPr>
-              <a:t>dbaird16@bloomberg.net</a:t>
+              <a:t>}@fordham.edu, dbaird16@bloomberg.net</a:t>
             </a:r>
             <a:endParaRPr lang="en-GB" sz="1200" dirty="0"/>
           </a:p>
@@ -3441,7 +3793,7 @@
           <p:cNvPr id="8" name="Content Placeholder 2">
             <a:extLst>
               <a:ext uri="{FF2B5EF4-FFF2-40B4-BE49-F238E27FC236}">
-                <a16:creationId xmlns:a16="http://schemas.microsoft.com/office/drawing/2014/main" id="{444FEBB0-90F3-4F4B-AB94-A1E9FFA5789C}"/>
+                <a16:creationId xmlns:a16="http://schemas.microsoft.com/office/drawing/2014/main" xmlns="" id="{444FEBB0-90F3-4F4B-AB94-A1E9FFA5789C}"/>
               </a:ext>
             </a:extLst>
           </p:cNvPr>
@@ -3665,7 +4017,7 @@
             </a:pPr>
             <a:r>
               <a:rPr lang="en-GB" sz="5400" dirty="0"/>
-              <a:t>have to manage software architectures and libraries </a:t>
+              <a:t>Have to manage software architectures and libraries </a:t>
             </a:r>
           </a:p>
           <a:p>
@@ -3708,7 +4060,7 @@
           <p:cNvPr id="9" name="Content Placeholder 2">
             <a:extLst>
               <a:ext uri="{FF2B5EF4-FFF2-40B4-BE49-F238E27FC236}">
-                <a16:creationId xmlns:a16="http://schemas.microsoft.com/office/drawing/2014/main" id="{55E4DA68-BB27-449B-BC2A-E719853E9F13}"/>
+                <a16:creationId xmlns:a16="http://schemas.microsoft.com/office/drawing/2014/main" xmlns="" id="{55E4DA68-BB27-449B-BC2A-E719853E9F13}"/>
               </a:ext>
             </a:extLst>
           </p:cNvPr>
@@ -3901,7 +4253,7 @@
               <a:buNone/>
             </a:pPr>
             <a:r>
-              <a:rPr lang="en-GB" sz="5400" dirty="0">
+              <a:rPr lang="en-GB" sz="5400" b="1" dirty="0">
                 <a:solidFill>
                   <a:schemeClr val="accent1">
                     <a:lumMod val="50000"/>
@@ -3969,7 +4321,7 @@
           <p:cNvPr id="10" name="Rectangle 9">
             <a:extLst>
               <a:ext uri="{FF2B5EF4-FFF2-40B4-BE49-F238E27FC236}">
-                <a16:creationId xmlns:a16="http://schemas.microsoft.com/office/drawing/2014/main" id="{80EB376C-7597-4F81-9E28-15E547B53E64}"/>
+                <a16:creationId xmlns:a16="http://schemas.microsoft.com/office/drawing/2014/main" xmlns="" id="{80EB376C-7597-4F81-9E28-15E547B53E64}"/>
               </a:ext>
             </a:extLst>
           </p:cNvPr>
@@ -3978,8 +4330,8 @@
         </p:nvSpPr>
         <p:spPr>
           <a:xfrm>
-            <a:off x="1257304" y="23845696"/>
-            <a:ext cx="12515905" cy="6740307"/>
+            <a:off x="1369542" y="23991456"/>
+            <a:ext cx="12515905" cy="6278642"/>
           </a:xfrm>
           <a:prstGeom prst="rect">
             <a:avLst/>
@@ -4005,10 +4357,6 @@
           </a:p>
           <a:p>
             <a:r>
-              <a:rPr lang="en-GB" sz="5400" dirty="0"/>
-              <a:t>=&gt; </a:t>
-            </a:r>
-            <a:r>
               <a:rPr lang="en-GB" sz="5400" b="1" dirty="0">
                 <a:solidFill>
                   <a:schemeClr val="accent1">
@@ -4025,7 +4373,25 @@
             <a:br>
               <a:rPr lang="en-GB" sz="5400" dirty="0"/>
             </a:br>
-            <a:endParaRPr lang="en-GB" sz="5400" dirty="0"/>
+            <a:r>
+              <a:rPr lang="en-GB" sz="2400" dirty="0">
+                <a:solidFill>
+                  <a:schemeClr val="accent5">
+                    <a:lumMod val="40000"/>
+                    <a:lumOff val="60000"/>
+                  </a:schemeClr>
+                </a:solidFill>
+              </a:rPr>
+              <a:t>.</a:t>
+            </a:r>
+            <a:endParaRPr lang="en-GB" sz="5400" dirty="0">
+              <a:solidFill>
+                <a:schemeClr val="accent5">
+                  <a:lumMod val="40000"/>
+                  <a:lumOff val="60000"/>
+                </a:schemeClr>
+              </a:solidFill>
+            </a:endParaRPr>
           </a:p>
           <a:p>
             <a:r>
@@ -4040,15 +4406,12 @@
               <a:rPr lang="en-GB" sz="5400" dirty="0"/>
               <a:t> such as </a:t>
             </a:r>
-            <a:r>
-              <a:rPr lang="en-GB" sz="5400" dirty="0" err="1"/>
-              <a:t>callgraphs</a:t>
-            </a:r>
+          </a:p>
+          <a:p>
             <a:r>
               <a:rPr lang="en-GB" sz="5400" dirty="0"/>
-              <a:t>, flowgraphs, etc.</a:t>
-            </a:r>
-            <a:endParaRPr lang="en-US" sz="5400" dirty="0"/>
+              <a:t>call graphs, flowgraphs, etc.</a:t>
+            </a:r>
           </a:p>
         </p:txBody>
       </p:sp>
@@ -4057,7 +4420,7 @@
           <p:cNvPr id="11" name="Picture 10">
             <a:extLst>
               <a:ext uri="{FF2B5EF4-FFF2-40B4-BE49-F238E27FC236}">
-                <a16:creationId xmlns:a16="http://schemas.microsoft.com/office/drawing/2014/main" id="{21B7F7C9-96D8-470E-9A99-86EB4358E0CD}"/>
+                <a16:creationId xmlns:a16="http://schemas.microsoft.com/office/drawing/2014/main" xmlns="" id="{21B7F7C9-96D8-470E-9A99-86EB4358E0CD}"/>
               </a:ext>
             </a:extLst>
           </p:cNvPr>
@@ -4080,7 +4443,7 @@
         </p:blipFill>
         <p:spPr>
           <a:xfrm>
-            <a:off x="9054046" y="25241965"/>
+            <a:off x="9070586" y="25270216"/>
             <a:ext cx="2121954" cy="1441444"/>
           </a:xfrm>
           <a:prstGeom prst="rect">
@@ -4093,7 +4456,7 @@
           <p:cNvPr id="12" name="Picture 11">
             <a:extLst>
               <a:ext uri="{FF2B5EF4-FFF2-40B4-BE49-F238E27FC236}">
-                <a16:creationId xmlns:a16="http://schemas.microsoft.com/office/drawing/2014/main" id="{F63FE18F-7DEE-4513-9971-8A2914199B10}"/>
+                <a16:creationId xmlns:a16="http://schemas.microsoft.com/office/drawing/2014/main" xmlns="" id="{F63FE18F-7DEE-4513-9971-8A2914199B10}"/>
               </a:ext>
             </a:extLst>
           </p:cNvPr>
@@ -4101,13 +4464,13 @@
           <p:nvPr/>
         </p:nvPicPr>
         <p:blipFill rotWithShape="1">
-          <a:blip r:embed="rId4"/>
+          <a:blip r:embed="rId3"/>
           <a:srcRect r="1089"/>
           <a:stretch/>
         </p:blipFill>
         <p:spPr bwMode="auto">
           <a:xfrm>
-            <a:off x="1381188" y="30916700"/>
+            <a:off x="1369542" y="31116031"/>
             <a:ext cx="12403667" cy="7367299"/>
           </a:xfrm>
           <a:prstGeom prst="rect">
@@ -4128,7 +4491,7 @@
           <p:cNvPr id="14" name="Rectangle 13">
             <a:extLst>
               <a:ext uri="{FF2B5EF4-FFF2-40B4-BE49-F238E27FC236}">
-                <a16:creationId xmlns:a16="http://schemas.microsoft.com/office/drawing/2014/main" id="{44C6FC17-B7A1-4DB1-A20C-C155DCB654ED}"/>
+                <a16:creationId xmlns:a16="http://schemas.microsoft.com/office/drawing/2014/main" xmlns="" id="{44C6FC17-B7A1-4DB1-A20C-C155DCB654ED}"/>
               </a:ext>
             </a:extLst>
           </p:cNvPr>
@@ -4137,7 +4500,7 @@
         </p:nvSpPr>
         <p:spPr>
           <a:xfrm>
-            <a:off x="4000493" y="38283999"/>
+            <a:off x="4000493" y="38483330"/>
             <a:ext cx="8388835" cy="1323439"/>
           </a:xfrm>
           <a:prstGeom prst="rect">
@@ -4182,7 +4545,7 @@
           <p:cNvPr id="16" name="Content Placeholder 2">
             <a:extLst>
               <a:ext uri="{FF2B5EF4-FFF2-40B4-BE49-F238E27FC236}">
-                <a16:creationId xmlns:a16="http://schemas.microsoft.com/office/drawing/2014/main" id="{B3F80488-1C04-47CF-831D-96ABA3090E8C}"/>
+                <a16:creationId xmlns:a16="http://schemas.microsoft.com/office/drawing/2014/main" xmlns="" id="{B3F80488-1C04-47CF-831D-96ABA3090E8C}"/>
               </a:ext>
             </a:extLst>
           </p:cNvPr>
@@ -4193,7 +4556,7 @@
         </p:nvSpPr>
         <p:spPr>
           <a:xfrm>
-            <a:off x="15683445" y="11505856"/>
+            <a:off x="15683445" y="11379200"/>
             <a:ext cx="12403667" cy="1126412"/>
           </a:xfrm>
           <a:prstGeom prst="rect">
@@ -4392,7 +4755,7 @@
           <p:cNvPr id="17" name="Rectangle 16">
             <a:extLst>
               <a:ext uri="{FF2B5EF4-FFF2-40B4-BE49-F238E27FC236}">
-                <a16:creationId xmlns:a16="http://schemas.microsoft.com/office/drawing/2014/main" id="{33DDB31B-18C6-4E61-A0D1-437471422139}"/>
+                <a16:creationId xmlns:a16="http://schemas.microsoft.com/office/drawing/2014/main" xmlns="" id="{33DDB31B-18C6-4E61-A0D1-437471422139}"/>
               </a:ext>
             </a:extLst>
           </p:cNvPr>
@@ -4402,13 +4765,16 @@
         <p:spPr>
           <a:xfrm>
             <a:off x="15683444" y="12363535"/>
-            <a:ext cx="9885889" cy="9141797"/>
+            <a:ext cx="12403668" cy="9718988"/>
           </a:xfrm>
           <a:prstGeom prst="rect">
             <a:avLst/>
           </a:prstGeom>
           <a:solidFill>
-            <a:srgbClr val="BCBA60"/>
+            <a:schemeClr val="accent6">
+              <a:lumMod val="60000"/>
+              <a:lumOff val="40000"/>
+            </a:schemeClr>
           </a:solidFill>
           <a:ln>
             <a:noFill/>
@@ -4444,7 +4810,7 @@
           <p:cNvPr id="19" name="Picture 18">
             <a:extLst>
               <a:ext uri="{FF2B5EF4-FFF2-40B4-BE49-F238E27FC236}">
-                <a16:creationId xmlns:a16="http://schemas.microsoft.com/office/drawing/2014/main" id="{7DA66BBD-50F8-43BD-9813-41BC4BB68576}"/>
+                <a16:creationId xmlns:a16="http://schemas.microsoft.com/office/drawing/2014/main" xmlns="" id="{7DA66BBD-50F8-43BD-9813-41BC4BB68576}"/>
               </a:ext>
             </a:extLst>
           </p:cNvPr>
@@ -4454,15 +4820,15 @@
           <p:nvPr/>
         </p:nvPicPr>
         <p:blipFill>
-          <a:blip r:embed="rId5"/>
+          <a:blip r:embed="rId4"/>
           <a:stretch>
             <a:fillRect/>
           </a:stretch>
         </p:blipFill>
         <p:spPr>
           <a:xfrm>
-            <a:off x="16378005" y="12695716"/>
-            <a:ext cx="8562418" cy="4200427"/>
+            <a:off x="15782374" y="12505612"/>
+            <a:ext cx="9629439" cy="4723871"/>
           </a:xfrm>
           <a:prstGeom prst="rect">
             <a:avLst/>
@@ -4474,7 +4840,7 @@
           <p:cNvPr id="20" name="Content Placeholder 2">
             <a:extLst>
               <a:ext uri="{FF2B5EF4-FFF2-40B4-BE49-F238E27FC236}">
-                <a16:creationId xmlns:a16="http://schemas.microsoft.com/office/drawing/2014/main" id="{AF4A2FC3-FFF1-4C6C-A319-345F81A71624}"/>
+                <a16:creationId xmlns:a16="http://schemas.microsoft.com/office/drawing/2014/main" xmlns="" id="{AF4A2FC3-FFF1-4C6C-A319-345F81A71624}"/>
               </a:ext>
             </a:extLst>
           </p:cNvPr>
@@ -4684,7 +5050,7 @@
           <p:cNvPr id="21" name="Rectangle 20">
             <a:extLst>
               <a:ext uri="{FF2B5EF4-FFF2-40B4-BE49-F238E27FC236}">
-                <a16:creationId xmlns:a16="http://schemas.microsoft.com/office/drawing/2014/main" id="{9076707A-062F-48C2-A924-A9FFE271A1D8}"/>
+                <a16:creationId xmlns:a16="http://schemas.microsoft.com/office/drawing/2014/main" xmlns="" id="{9076707A-062F-48C2-A924-A9FFE271A1D8}"/>
               </a:ext>
             </a:extLst>
           </p:cNvPr>
@@ -4694,13 +5060,16 @@
         <p:spPr>
           <a:xfrm>
             <a:off x="15683444" y="23543521"/>
-            <a:ext cx="9885889" cy="11099170"/>
+            <a:ext cx="12403668" cy="11099170"/>
           </a:xfrm>
           <a:prstGeom prst="rect">
             <a:avLst/>
           </a:prstGeom>
           <a:solidFill>
-            <a:srgbClr val="BCBA60"/>
+            <a:schemeClr val="accent6">
+              <a:lumMod val="60000"/>
+              <a:lumOff val="40000"/>
+            </a:schemeClr>
           </a:solidFill>
           <a:ln>
             <a:noFill/>
@@ -4736,7 +5105,7 @@
           <p:cNvPr id="22" name="Picture 21">
             <a:extLst>
               <a:ext uri="{FF2B5EF4-FFF2-40B4-BE49-F238E27FC236}">
-                <a16:creationId xmlns:a16="http://schemas.microsoft.com/office/drawing/2014/main" id="{1ED8D533-A480-4D82-8C56-130A59710C8F}"/>
+                <a16:creationId xmlns:a16="http://schemas.microsoft.com/office/drawing/2014/main" xmlns="" id="{1ED8D533-A480-4D82-8C56-130A59710C8F}"/>
               </a:ext>
             </a:extLst>
           </p:cNvPr>
@@ -4744,7 +5113,7 @@
           <p:nvPr/>
         </p:nvPicPr>
         <p:blipFill rotWithShape="1">
-          <a:blip r:embed="rId6">
+          <a:blip r:embed="rId5">
             <a:extLst>
               <a:ext uri="{28A0092B-C50C-407E-A947-70E740481C1C}">
                 <a14:useLocalDpi xmlns:a14="http://schemas.microsoft.com/office/drawing/2010/main" val="0"/>
@@ -4756,8 +5125,8 @@
         </p:blipFill>
         <p:spPr bwMode="auto">
           <a:xfrm>
-            <a:off x="16378005" y="23922833"/>
-            <a:ext cx="7924800" cy="2889965"/>
+            <a:off x="16079400" y="23667137"/>
+            <a:ext cx="10501310" cy="3829550"/>
           </a:xfrm>
           <a:prstGeom prst="rect">
             <a:avLst/>
@@ -4777,7 +5146,7 @@
           <p:cNvPr id="23" name="Rectangle 22">
             <a:extLst>
               <a:ext uri="{FF2B5EF4-FFF2-40B4-BE49-F238E27FC236}">
-                <a16:creationId xmlns:a16="http://schemas.microsoft.com/office/drawing/2014/main" id="{35DF4807-000A-475B-8D23-F74459543DE7}"/>
+                <a16:creationId xmlns:a16="http://schemas.microsoft.com/office/drawing/2014/main" xmlns="" id="{35DF4807-000A-475B-8D23-F74459543DE7}"/>
               </a:ext>
             </a:extLst>
           </p:cNvPr>
@@ -4786,21 +5155,22 @@
         </p:nvSpPr>
         <p:spPr>
           <a:xfrm>
-            <a:off x="16378005" y="27159668"/>
-            <a:ext cx="7404591" cy="1200329"/>
+            <a:off x="15782374" y="27555021"/>
+            <a:ext cx="11469550" cy="646331"/>
           </a:xfrm>
           <a:prstGeom prst="rect">
             <a:avLst/>
           </a:prstGeom>
         </p:spPr>
         <p:txBody>
-          <a:bodyPr wrap="none">
+          <a:bodyPr wrap="square">
             <a:spAutoFit/>
           </a:bodyPr>
           <a:lstStyle/>
           <a:p>
-            <a:r>
-              <a:rPr lang="en-US" sz="3600" dirty="0">
+            <a:pPr algn="ctr"/>
+            <a:r>
+              <a:rPr lang="en-US" sz="3600" b="1" dirty="0">
                 <a:solidFill>
                   <a:schemeClr val="accent1">
                     <a:lumMod val="50000"/>
@@ -4809,47 +5179,9 @@
                 <a:latin typeface="Times New Roman" panose="02020603050405020304" pitchFamily="18" charset="0"/>
                 <a:ea typeface="SimSun" panose="02010600030101010101" pitchFamily="2" charset="-122"/>
               </a:rPr>
-              <a:t>Statically unresolved call from Python </a:t>
-            </a:r>
-          </a:p>
-          <a:p>
-            <a:r>
-              <a:rPr lang="en-US" sz="3600" dirty="0">
-                <a:solidFill>
-                  <a:schemeClr val="accent1">
-                    <a:lumMod val="50000"/>
-                  </a:schemeClr>
-                </a:solidFill>
-                <a:latin typeface="Times New Roman" panose="02020603050405020304" pitchFamily="18" charset="0"/>
-                <a:ea typeface="SimSun" panose="02010600030101010101" pitchFamily="2" charset="-122"/>
-              </a:rPr>
-              <a:t>to </a:t>
-            </a:r>
-            <a:r>
-              <a:rPr lang="en-US" sz="3600" dirty="0" err="1">
-                <a:solidFill>
-                  <a:schemeClr val="accent1">
-                    <a:lumMod val="50000"/>
-                  </a:schemeClr>
-                </a:solidFill>
-                <a:latin typeface="Times New Roman" panose="02020603050405020304" pitchFamily="18" charset="0"/>
-                <a:ea typeface="SimSun" panose="02010600030101010101" pitchFamily="2" charset="-122"/>
-              </a:rPr>
-              <a:t>Javascript</a:t>
-            </a:r>
-            <a:r>
-              <a:rPr lang="en-US" sz="3600" dirty="0">
-                <a:solidFill>
-                  <a:schemeClr val="accent1">
-                    <a:lumMod val="50000"/>
-                  </a:schemeClr>
-                </a:solidFill>
-                <a:latin typeface="Times New Roman" panose="02020603050405020304" pitchFamily="18" charset="0"/>
-                <a:ea typeface="SimSun" panose="02010600030101010101" pitchFamily="2" charset="-122"/>
-              </a:rPr>
-              <a:t> </a:t>
-            </a:r>
-            <a:endParaRPr lang="en-US" sz="3600" dirty="0">
+              <a:t>Statically unresolved call from Python to JavaScript </a:t>
+            </a:r>
+            <a:endParaRPr lang="en-US" sz="3600" b="1" dirty="0">
               <a:solidFill>
                 <a:schemeClr val="accent1">
                   <a:lumMod val="50000"/>
@@ -4864,7 +5196,7 @@
           <p:cNvPr id="24" name="Picture 23">
             <a:extLst>
               <a:ext uri="{FF2B5EF4-FFF2-40B4-BE49-F238E27FC236}">
-                <a16:creationId xmlns:a16="http://schemas.microsoft.com/office/drawing/2014/main" id="{964E5693-4DDE-4CD1-9B90-CE04ED762DE8}"/>
+                <a16:creationId xmlns:a16="http://schemas.microsoft.com/office/drawing/2014/main" xmlns="" id="{964E5693-4DDE-4CD1-9B90-CE04ED762DE8}"/>
               </a:ext>
             </a:extLst>
           </p:cNvPr>
@@ -4872,7 +5204,7 @@
           <p:nvPr/>
         </p:nvPicPr>
         <p:blipFill rotWithShape="1">
-          <a:blip r:embed="rId7" cstate="print">
+          <a:blip r:embed="rId6" cstate="print">
             <a:extLst>
               <a:ext uri="{28A0092B-C50C-407E-A947-70E740481C1C}">
                 <a14:useLocalDpi xmlns:a14="http://schemas.microsoft.com/office/drawing/2010/main" val="0"/>
@@ -4884,8 +5216,8 @@
         </p:blipFill>
         <p:spPr bwMode="auto">
           <a:xfrm>
-            <a:off x="16378005" y="28412996"/>
-            <a:ext cx="8499973" cy="5006091"/>
+            <a:off x="18635010" y="28322908"/>
+            <a:ext cx="9262976" cy="5455464"/>
           </a:xfrm>
           <a:prstGeom prst="rect">
             <a:avLst/>
@@ -4905,7 +5237,7 @@
           <p:cNvPr id="25" name="Rectangle 24">
             <a:extLst>
               <a:ext uri="{FF2B5EF4-FFF2-40B4-BE49-F238E27FC236}">
-                <a16:creationId xmlns:a16="http://schemas.microsoft.com/office/drawing/2014/main" id="{FE546F0D-0C87-4C27-AD41-92302DCDE384}"/>
+                <a16:creationId xmlns:a16="http://schemas.microsoft.com/office/drawing/2014/main" xmlns="" id="{FE546F0D-0C87-4C27-AD41-92302DCDE384}"/>
               </a:ext>
             </a:extLst>
           </p:cNvPr>
@@ -4914,8 +5246,8 @@
         </p:nvSpPr>
         <p:spPr>
           <a:xfrm>
-            <a:off x="16378005" y="33619021"/>
-            <a:ext cx="7699544" cy="646331"/>
+            <a:off x="18635010" y="33840100"/>
+            <a:ext cx="8306761" cy="646331"/>
           </a:xfrm>
           <a:prstGeom prst="rect">
             <a:avLst/>
@@ -4928,7 +5260,7 @@
           <a:lstStyle/>
           <a:p>
             <a:r>
-              <a:rPr lang="en-US" sz="3600" dirty="0">
+              <a:rPr lang="en-US" sz="3600" b="1" dirty="0">
                 <a:solidFill>
                   <a:schemeClr val="accent1">
                     <a:lumMod val="50000"/>
@@ -4939,7 +5271,7 @@
               </a:rPr>
               <a:t>Multilingual Call Graph with Circularity</a:t>
             </a:r>
-            <a:endParaRPr lang="en-US" sz="3600" dirty="0">
+            <a:endParaRPr lang="en-US" sz="3600" b="1" dirty="0">
               <a:solidFill>
                 <a:schemeClr val="accent1">
                   <a:lumMod val="50000"/>
@@ -4954,7 +5286,7 @@
           <p:cNvPr id="26" name="Picture 25">
             <a:extLst>
               <a:ext uri="{FF2B5EF4-FFF2-40B4-BE49-F238E27FC236}">
-                <a16:creationId xmlns:a16="http://schemas.microsoft.com/office/drawing/2014/main" id="{F2F1B2C3-DD9B-47E9-A2BD-AE362AD7F47C}"/>
+                <a16:creationId xmlns:a16="http://schemas.microsoft.com/office/drawing/2014/main" xmlns="" id="{F2F1B2C3-DD9B-47E9-A2BD-AE362AD7F47C}"/>
               </a:ext>
             </a:extLst>
           </p:cNvPr>
@@ -4962,11 +5294,11 @@
           <p:nvPr/>
         </p:nvPicPr>
         <p:blipFill rotWithShape="1">
-          <a:blip r:embed="rId8">
+          <a:blip r:embed="rId7">
             <a:extLst>
               <a:ext uri="{BEBA8EAE-BF5A-486C-A8C5-ECC9F3942E4B}">
                 <a14:imgProps xmlns:a14="http://schemas.microsoft.com/office/drawing/2010/main">
-                  <a14:imgLayer r:embed="rId9">
+                  <a14:imgLayer r:embed="rId8">
                     <a14:imgEffect>
                       <a14:saturation sat="0"/>
                     </a14:imgEffect>
@@ -4983,8 +5315,8 @@
         </p:blipFill>
         <p:spPr bwMode="auto">
           <a:xfrm>
-            <a:off x="18863682" y="17016725"/>
-            <a:ext cx="6043192" cy="4333531"/>
+            <a:off x="21330055" y="17177137"/>
+            <a:ext cx="6567931" cy="4709818"/>
           </a:xfrm>
           <a:prstGeom prst="rect">
             <a:avLst/>
@@ -5004,7 +5336,7 @@
           <p:cNvPr id="27" name="Rectangle 26">
             <a:extLst>
               <a:ext uri="{FF2B5EF4-FFF2-40B4-BE49-F238E27FC236}">
-                <a16:creationId xmlns:a16="http://schemas.microsoft.com/office/drawing/2014/main" id="{8A17B516-164C-486F-8671-AFB086322CBF}"/>
+                <a16:creationId xmlns:a16="http://schemas.microsoft.com/office/drawing/2014/main" xmlns="" id="{8A17B516-164C-486F-8671-AFB086322CBF}"/>
               </a:ext>
             </a:extLst>
           </p:cNvPr>
@@ -5013,8 +5345,8 @@
         </p:nvSpPr>
         <p:spPr>
           <a:xfrm>
-            <a:off x="16858173" y="18796305"/>
-            <a:ext cx="3801041" cy="1754326"/>
+            <a:off x="16505833" y="18690481"/>
+            <a:ext cx="4006225" cy="1754326"/>
           </a:xfrm>
           <a:prstGeom prst="rect">
             <a:avLst/>
@@ -5027,7 +5359,7 @@
           <a:lstStyle/>
           <a:p>
             <a:r>
-              <a:rPr lang="en-US" sz="3600" dirty="0">
+              <a:rPr lang="en-US" sz="3600" b="1" dirty="0">
                 <a:solidFill>
                   <a:schemeClr val="accent1">
                     <a:lumMod val="50000"/>
@@ -5041,7 +5373,7 @@
           </a:p>
           <a:p>
             <a:r>
-              <a:rPr lang="en-US" sz="3600" dirty="0">
+              <a:rPr lang="en-US" sz="3600" b="1" dirty="0">
                 <a:solidFill>
                   <a:schemeClr val="accent1">
                     <a:lumMod val="50000"/>
@@ -5055,7 +5387,7 @@
           </a:p>
           <a:p>
             <a:r>
-              <a:rPr lang="en-US" sz="3600" dirty="0">
+              <a:rPr lang="en-US" sz="3600" b="1" dirty="0">
                 <a:solidFill>
                   <a:schemeClr val="accent1">
                     <a:lumMod val="50000"/>
@@ -5064,31 +5396,7 @@
                 <a:latin typeface="Times New Roman" panose="02020603050405020304" pitchFamily="18" charset="0"/>
                 <a:ea typeface="SimSun" panose="02010600030101010101" pitchFamily="2" charset="-122"/>
               </a:rPr>
-              <a:t>in </a:t>
-            </a:r>
-            <a:r>
-              <a:rPr lang="en-US" sz="3600" b="1" dirty="0">
-                <a:solidFill>
-                  <a:schemeClr val="accent1">
-                    <a:lumMod val="50000"/>
-                  </a:schemeClr>
-                </a:solidFill>
-                <a:latin typeface="Times New Roman" panose="02020603050405020304" pitchFamily="18" charset="0"/>
-                <a:ea typeface="SimSun" panose="02010600030101010101" pitchFamily="2" charset="-122"/>
-              </a:rPr>
-              <a:t>one </a:t>
-            </a:r>
-            <a:r>
-              <a:rPr lang="en-US" sz="3600" b="1" dirty="0" err="1">
-                <a:solidFill>
-                  <a:schemeClr val="accent1">
-                    <a:lumMod val="50000"/>
-                  </a:schemeClr>
-                </a:solidFill>
-                <a:latin typeface="Times New Roman" panose="02020603050405020304" pitchFamily="18" charset="0"/>
-                <a:ea typeface="SimSun" panose="02010600030101010101" pitchFamily="2" charset="-122"/>
-              </a:rPr>
-              <a:t>callgraph</a:t>
+              <a:t>in one call graph</a:t>
             </a:r>
             <a:endParaRPr lang="en-US" sz="3600" b="1" dirty="0">
               <a:solidFill>
@@ -5105,7 +5413,7 @@
           <p:cNvPr id="28" name="Content Placeholder 2">
             <a:extLst>
               <a:ext uri="{FF2B5EF4-FFF2-40B4-BE49-F238E27FC236}">
-                <a16:creationId xmlns:a16="http://schemas.microsoft.com/office/drawing/2014/main" id="{09738B0A-872D-49AA-8981-C9B86374D5FD}"/>
+                <a16:creationId xmlns:a16="http://schemas.microsoft.com/office/drawing/2014/main" xmlns="" id="{09738B0A-872D-49AA-8981-C9B86374D5FD}"/>
               </a:ext>
             </a:extLst>
           </p:cNvPr>
@@ -5117,7 +5425,7 @@
         <p:spPr>
           <a:xfrm>
             <a:off x="15782375" y="34966512"/>
-            <a:ext cx="12403667" cy="5692775"/>
+            <a:ext cx="12403667" cy="5303053"/>
           </a:xfrm>
           <a:prstGeom prst="rect">
             <a:avLst/>
@@ -5329,10 +5637,7 @@
               <a:buFont typeface="Arial" panose="020B0604020202020204" pitchFamily="34" charset="0"/>
               <a:buNone/>
             </a:pPr>
-            <a:r>
-              <a:rPr lang="en-GB" sz="5400" dirty="0"/>
-              <a:t>To download MLSA:</a:t>
-            </a:r>
+            <a:endParaRPr lang="en-GB" sz="1600" dirty="0"/>
           </a:p>
           <a:p>
             <a:pPr marL="0" indent="0">
@@ -5344,7 +5649,15 @@
             </a:pPr>
             <a:r>
               <a:rPr lang="en-GB" sz="5400" dirty="0"/>
-              <a:t>       &lt;ADD GITHUB URL HERE&gt;</a:t>
+              <a:t>GitHub:	https://</a:t>
+            </a:r>
+            <a:r>
+              <a:rPr lang="en-GB" sz="5400" dirty="0" err="1"/>
+              <a:t>git.io</a:t>
+            </a:r>
+            <a:r>
+              <a:rPr lang="en-GB" sz="5400" dirty="0"/>
+              <a:t>/MLSA</a:t>
             </a:r>
           </a:p>
           <a:p>
@@ -5357,7 +5670,36 @@
             </a:pPr>
             <a:r>
               <a:rPr lang="en-GB" sz="5400" dirty="0"/>
-              <a:t>Email:</a:t>
+              <a:t>Email:	</a:t>
+            </a:r>
+            <a:r>
+              <a:rPr lang="en-GB" sz="5400" dirty="0" err="1"/>
+              <a:t>multilingualSA@gmail.com</a:t>
+            </a:r>
+            <a:endParaRPr lang="en-GB" sz="5400" dirty="0"/>
+          </a:p>
+          <a:p>
+            <a:pPr marL="0" lvl="1" indent="0">
+              <a:spcBef>
+                <a:spcPts val="600"/>
+              </a:spcBef>
+              <a:buNone/>
+            </a:pPr>
+            <a:r>
+              <a:rPr lang="en-GB" sz="5400" dirty="0" err="1"/>
+              <a:t>Twiki</a:t>
+            </a:r>
+            <a:r>
+              <a:rPr lang="en-GB" sz="5400" dirty="0"/>
+              <a:t>:	https://</a:t>
+            </a:r>
+            <a:r>
+              <a:rPr lang="en-GB" sz="5400" dirty="0" err="1"/>
+              <a:t>goo.gl</a:t>
+            </a:r>
+            <a:r>
+              <a:rPr lang="en-GB" sz="5400" dirty="0"/>
+              <a:t>/6mvyNS</a:t>
             </a:r>
           </a:p>
           <a:p>
@@ -5365,16 +5707,1727 @@
               <a:spcBef>
                 <a:spcPts val="600"/>
               </a:spcBef>
-              <a:buFont typeface="Arial" panose="020B0604020202020204" pitchFamily="34" charset="0"/>
               <a:buNone/>
             </a:pPr>
             <a:r>
               <a:rPr lang="en-GB" sz="5400" dirty="0"/>
-              <a:t>	multilingualSA@gmail.com</a:t>
-            </a:r>
-          </a:p>
-        </p:txBody>
-      </p:sp>
+              <a:t>YouTube:	https://</a:t>
+            </a:r>
+            <a:r>
+              <a:rPr lang="en-GB" sz="5400" dirty="0" err="1"/>
+              <a:t>goo.gl</a:t>
+            </a:r>
+            <a:r>
+              <a:rPr lang="en-GB" sz="5400" dirty="0"/>
+              <a:t>/g8ra15</a:t>
+            </a:r>
+          </a:p>
+        </p:txBody>
+      </p:sp>
+      <p:sp>
+        <p:nvSpPr>
+          <p:cNvPr id="2" name="Rectangle 1">
+            <a:extLst>
+              <a:ext uri="{FF2B5EF4-FFF2-40B4-BE49-F238E27FC236}">
+                <a16:creationId xmlns:a16="http://schemas.microsoft.com/office/drawing/2014/main" xmlns="" id="{ECE764AB-4F56-4DB7-BF2E-8E4DD1EA1ABF}"/>
+              </a:ext>
+            </a:extLst>
+          </p:cNvPr>
+          <p:cNvSpPr/>
+          <p:nvPr/>
+        </p:nvSpPr>
+        <p:spPr>
+          <a:xfrm>
+            <a:off x="17030700" y="13233400"/>
+            <a:ext cx="584200" cy="196850"/>
+          </a:xfrm>
+          <a:prstGeom prst="rect">
+            <a:avLst/>
+          </a:prstGeom>
+          <a:noFill/>
+          <a:ln w="28575">
+            <a:solidFill>
+              <a:srgbClr val="00B050"/>
+            </a:solidFill>
+          </a:ln>
+        </p:spPr>
+        <p:style>
+          <a:lnRef idx="2">
+            <a:schemeClr val="accent1">
+              <a:shade val="50000"/>
+            </a:schemeClr>
+          </a:lnRef>
+          <a:fillRef idx="1">
+            <a:schemeClr val="accent1"/>
+          </a:fillRef>
+          <a:effectRef idx="0">
+            <a:schemeClr val="accent1"/>
+          </a:effectRef>
+          <a:fontRef idx="minor">
+            <a:schemeClr val="lt1"/>
+          </a:fontRef>
+        </p:style>
+        <p:txBody>
+          <a:bodyPr rtlCol="0" anchor="ctr"/>
+          <a:lstStyle/>
+          <a:p>
+            <a:pPr algn="ctr"/>
+            <a:endParaRPr lang="en-US"/>
+          </a:p>
+        </p:txBody>
+      </p:sp>
+      <p:sp>
+        <p:nvSpPr>
+          <p:cNvPr id="30" name="Rectangle 29">
+            <a:extLst>
+              <a:ext uri="{FF2B5EF4-FFF2-40B4-BE49-F238E27FC236}">
+                <a16:creationId xmlns:a16="http://schemas.microsoft.com/office/drawing/2014/main" xmlns="" id="{212957DB-1E1E-40C8-B234-89D000DDFEFC}"/>
+              </a:ext>
+            </a:extLst>
+          </p:cNvPr>
+          <p:cNvSpPr/>
+          <p:nvPr/>
+        </p:nvSpPr>
+        <p:spPr>
+          <a:xfrm>
+            <a:off x="22409150" y="13566741"/>
+            <a:ext cx="438150" cy="219109"/>
+          </a:xfrm>
+          <a:prstGeom prst="rect">
+            <a:avLst/>
+          </a:prstGeom>
+          <a:noFill/>
+          <a:ln w="28575">
+            <a:solidFill>
+              <a:srgbClr val="00B050"/>
+            </a:solidFill>
+          </a:ln>
+        </p:spPr>
+        <p:style>
+          <a:lnRef idx="2">
+            <a:schemeClr val="accent1">
+              <a:shade val="50000"/>
+            </a:schemeClr>
+          </a:lnRef>
+          <a:fillRef idx="1">
+            <a:schemeClr val="accent1"/>
+          </a:fillRef>
+          <a:effectRef idx="0">
+            <a:schemeClr val="accent1"/>
+          </a:effectRef>
+          <a:fontRef idx="minor">
+            <a:schemeClr val="lt1"/>
+          </a:fontRef>
+        </p:style>
+        <p:txBody>
+          <a:bodyPr rtlCol="0" anchor="ctr"/>
+          <a:lstStyle/>
+          <a:p>
+            <a:pPr algn="ctr"/>
+            <a:endParaRPr lang="en-US"/>
+          </a:p>
+        </p:txBody>
+      </p:sp>
+      <p:sp>
+        <p:nvSpPr>
+          <p:cNvPr id="31" name="Rectangle 30">
+            <a:extLst>
+              <a:ext uri="{FF2B5EF4-FFF2-40B4-BE49-F238E27FC236}">
+                <a16:creationId xmlns:a16="http://schemas.microsoft.com/office/drawing/2014/main" xmlns="" id="{B8AF304B-3999-4CBC-B47E-E0E3F545B1FB}"/>
+              </a:ext>
+            </a:extLst>
+          </p:cNvPr>
+          <p:cNvSpPr/>
+          <p:nvPr/>
+        </p:nvSpPr>
+        <p:spPr>
+          <a:xfrm>
+            <a:off x="23482300" y="14027150"/>
+            <a:ext cx="450850" cy="209550"/>
+          </a:xfrm>
+          <a:prstGeom prst="rect">
+            <a:avLst/>
+          </a:prstGeom>
+          <a:noFill/>
+          <a:ln w="28575">
+            <a:solidFill>
+              <a:srgbClr val="00B050"/>
+            </a:solidFill>
+          </a:ln>
+        </p:spPr>
+        <p:style>
+          <a:lnRef idx="2">
+            <a:schemeClr val="accent1">
+              <a:shade val="50000"/>
+            </a:schemeClr>
+          </a:lnRef>
+          <a:fillRef idx="1">
+            <a:schemeClr val="accent1"/>
+          </a:fillRef>
+          <a:effectRef idx="0">
+            <a:schemeClr val="accent1"/>
+          </a:effectRef>
+          <a:fontRef idx="minor">
+            <a:schemeClr val="lt1"/>
+          </a:fontRef>
+        </p:style>
+        <p:txBody>
+          <a:bodyPr rtlCol="0" anchor="ctr"/>
+          <a:lstStyle/>
+          <a:p>
+            <a:pPr algn="ctr"/>
+            <a:endParaRPr lang="en-US"/>
+          </a:p>
+        </p:txBody>
+      </p:sp>
+      <p:sp>
+        <p:nvSpPr>
+          <p:cNvPr id="32" name="Rectangle 31">
+            <a:extLst>
+              <a:ext uri="{FF2B5EF4-FFF2-40B4-BE49-F238E27FC236}">
+                <a16:creationId xmlns:a16="http://schemas.microsoft.com/office/drawing/2014/main" xmlns="" id="{700AAD3F-37DC-4C52-BEC9-630E97169AA8}"/>
+              </a:ext>
+            </a:extLst>
+          </p:cNvPr>
+          <p:cNvSpPr/>
+          <p:nvPr/>
+        </p:nvSpPr>
+        <p:spPr>
+          <a:xfrm>
+            <a:off x="18967450" y="15345650"/>
+            <a:ext cx="412750" cy="262650"/>
+          </a:xfrm>
+          <a:prstGeom prst="rect">
+            <a:avLst/>
+          </a:prstGeom>
+          <a:noFill/>
+          <a:ln w="28575">
+            <a:solidFill>
+              <a:srgbClr val="00B050"/>
+            </a:solidFill>
+          </a:ln>
+        </p:spPr>
+        <p:style>
+          <a:lnRef idx="2">
+            <a:schemeClr val="accent1">
+              <a:shade val="50000"/>
+            </a:schemeClr>
+          </a:lnRef>
+          <a:fillRef idx="1">
+            <a:schemeClr val="accent1"/>
+          </a:fillRef>
+          <a:effectRef idx="0">
+            <a:schemeClr val="accent1"/>
+          </a:effectRef>
+          <a:fontRef idx="minor">
+            <a:schemeClr val="lt1"/>
+          </a:fontRef>
+        </p:style>
+        <p:txBody>
+          <a:bodyPr rtlCol="0" anchor="ctr"/>
+          <a:lstStyle/>
+          <a:p>
+            <a:pPr algn="ctr"/>
+            <a:endParaRPr lang="en-US"/>
+          </a:p>
+        </p:txBody>
+      </p:sp>
+      <p:sp>
+        <p:nvSpPr>
+          <p:cNvPr id="33" name="Rectangle 32">
+            <a:extLst>
+              <a:ext uri="{FF2B5EF4-FFF2-40B4-BE49-F238E27FC236}">
+                <a16:creationId xmlns:a16="http://schemas.microsoft.com/office/drawing/2014/main" xmlns="" id="{4493D521-1DBC-470A-AE52-D49F9C9D67B0}"/>
+              </a:ext>
+            </a:extLst>
+          </p:cNvPr>
+          <p:cNvSpPr/>
+          <p:nvPr/>
+        </p:nvSpPr>
+        <p:spPr>
+          <a:xfrm>
+            <a:off x="23012400" y="15872380"/>
+            <a:ext cx="425450" cy="275670"/>
+          </a:xfrm>
+          <a:prstGeom prst="rect">
+            <a:avLst/>
+          </a:prstGeom>
+          <a:noFill/>
+          <a:ln w="28575">
+            <a:solidFill>
+              <a:srgbClr val="00B050"/>
+            </a:solidFill>
+          </a:ln>
+        </p:spPr>
+        <p:style>
+          <a:lnRef idx="2">
+            <a:schemeClr val="accent1">
+              <a:shade val="50000"/>
+            </a:schemeClr>
+          </a:lnRef>
+          <a:fillRef idx="1">
+            <a:schemeClr val="accent1"/>
+          </a:fillRef>
+          <a:effectRef idx="0">
+            <a:schemeClr val="accent1"/>
+          </a:effectRef>
+          <a:fontRef idx="minor">
+            <a:schemeClr val="lt1"/>
+          </a:fontRef>
+        </p:style>
+        <p:txBody>
+          <a:bodyPr rtlCol="0" anchor="ctr"/>
+          <a:lstStyle/>
+          <a:p>
+            <a:pPr algn="ctr"/>
+            <a:endParaRPr lang="en-US"/>
+          </a:p>
+        </p:txBody>
+      </p:sp>
+      <p:sp>
+        <p:nvSpPr>
+          <p:cNvPr id="34" name="Rectangle 33">
+            <a:extLst>
+              <a:ext uri="{FF2B5EF4-FFF2-40B4-BE49-F238E27FC236}">
+                <a16:creationId xmlns:a16="http://schemas.microsoft.com/office/drawing/2014/main" xmlns="" id="{1E8BB80A-1F7E-4191-BB80-4DA2D766BE0F}"/>
+              </a:ext>
+            </a:extLst>
+          </p:cNvPr>
+          <p:cNvSpPr/>
+          <p:nvPr/>
+        </p:nvSpPr>
+        <p:spPr>
+          <a:xfrm>
+            <a:off x="21871565" y="14027150"/>
+            <a:ext cx="410585" cy="209550"/>
+          </a:xfrm>
+          <a:prstGeom prst="rect">
+            <a:avLst/>
+          </a:prstGeom>
+          <a:noFill/>
+          <a:ln w="28575">
+            <a:solidFill>
+              <a:srgbClr val="7030A0"/>
+            </a:solidFill>
+          </a:ln>
+        </p:spPr>
+        <p:style>
+          <a:lnRef idx="2">
+            <a:schemeClr val="accent1">
+              <a:shade val="50000"/>
+            </a:schemeClr>
+          </a:lnRef>
+          <a:fillRef idx="1">
+            <a:schemeClr val="accent1"/>
+          </a:fillRef>
+          <a:effectRef idx="0">
+            <a:schemeClr val="accent1"/>
+          </a:effectRef>
+          <a:fontRef idx="minor">
+            <a:schemeClr val="lt1"/>
+          </a:fontRef>
+        </p:style>
+        <p:txBody>
+          <a:bodyPr rtlCol="0" anchor="ctr"/>
+          <a:lstStyle/>
+          <a:p>
+            <a:pPr algn="ctr"/>
+            <a:endParaRPr lang="en-US"/>
+          </a:p>
+        </p:txBody>
+      </p:sp>
+      <p:sp>
+        <p:nvSpPr>
+          <p:cNvPr id="35" name="Rectangle 34">
+            <a:extLst>
+              <a:ext uri="{FF2B5EF4-FFF2-40B4-BE49-F238E27FC236}">
+                <a16:creationId xmlns:a16="http://schemas.microsoft.com/office/drawing/2014/main" xmlns="" id="{2A4AFF55-6986-475D-B70B-2B059FD12BA2}"/>
+              </a:ext>
+            </a:extLst>
+          </p:cNvPr>
+          <p:cNvSpPr/>
+          <p:nvPr/>
+        </p:nvSpPr>
+        <p:spPr>
+          <a:xfrm>
+            <a:off x="22871584" y="14033500"/>
+            <a:ext cx="496416" cy="203200"/>
+          </a:xfrm>
+          <a:prstGeom prst="rect">
+            <a:avLst/>
+          </a:prstGeom>
+          <a:noFill/>
+          <a:ln w="28575">
+            <a:solidFill>
+              <a:srgbClr val="FF0000"/>
+            </a:solidFill>
+          </a:ln>
+        </p:spPr>
+        <p:style>
+          <a:lnRef idx="2">
+            <a:schemeClr val="accent1">
+              <a:shade val="50000"/>
+            </a:schemeClr>
+          </a:lnRef>
+          <a:fillRef idx="1">
+            <a:schemeClr val="accent1"/>
+          </a:fillRef>
+          <a:effectRef idx="0">
+            <a:schemeClr val="accent1"/>
+          </a:effectRef>
+          <a:fontRef idx="minor">
+            <a:schemeClr val="lt1"/>
+          </a:fontRef>
+        </p:style>
+        <p:txBody>
+          <a:bodyPr rtlCol="0" anchor="ctr"/>
+          <a:lstStyle/>
+          <a:p>
+            <a:pPr algn="ctr"/>
+            <a:endParaRPr lang="en-US"/>
+          </a:p>
+        </p:txBody>
+      </p:sp>
+      <p:sp>
+        <p:nvSpPr>
+          <p:cNvPr id="36" name="Rectangle 35">
+            <a:extLst>
+              <a:ext uri="{FF2B5EF4-FFF2-40B4-BE49-F238E27FC236}">
+                <a16:creationId xmlns:a16="http://schemas.microsoft.com/office/drawing/2014/main" xmlns="" id="{1DFB2D9C-C133-4D05-8843-2240ABAF8C3C}"/>
+              </a:ext>
+            </a:extLst>
+          </p:cNvPr>
+          <p:cNvSpPr/>
+          <p:nvPr/>
+        </p:nvSpPr>
+        <p:spPr>
+          <a:xfrm>
+            <a:off x="21158200" y="14027150"/>
+            <a:ext cx="387350" cy="209550"/>
+          </a:xfrm>
+          <a:prstGeom prst="rect">
+            <a:avLst/>
+          </a:prstGeom>
+          <a:noFill/>
+          <a:ln w="28575">
+            <a:solidFill>
+              <a:srgbClr val="00B0F0"/>
+            </a:solidFill>
+          </a:ln>
+        </p:spPr>
+        <p:style>
+          <a:lnRef idx="2">
+            <a:schemeClr val="accent1">
+              <a:shade val="50000"/>
+            </a:schemeClr>
+          </a:lnRef>
+          <a:fillRef idx="1">
+            <a:schemeClr val="accent1"/>
+          </a:fillRef>
+          <a:effectRef idx="0">
+            <a:schemeClr val="accent1"/>
+          </a:effectRef>
+          <a:fontRef idx="minor">
+            <a:schemeClr val="lt1"/>
+          </a:fontRef>
+        </p:style>
+        <p:txBody>
+          <a:bodyPr rtlCol="0" anchor="ctr"/>
+          <a:lstStyle/>
+          <a:p>
+            <a:pPr algn="ctr"/>
+            <a:endParaRPr lang="en-US"/>
+          </a:p>
+        </p:txBody>
+      </p:sp>
+      <p:sp>
+        <p:nvSpPr>
+          <p:cNvPr id="37" name="Rectangle 36">
+            <a:extLst>
+              <a:ext uri="{FF2B5EF4-FFF2-40B4-BE49-F238E27FC236}">
+                <a16:creationId xmlns:a16="http://schemas.microsoft.com/office/drawing/2014/main" xmlns="" id="{5151844B-6871-49B8-AF38-B90B95B98445}"/>
+              </a:ext>
+            </a:extLst>
+          </p:cNvPr>
+          <p:cNvSpPr/>
+          <p:nvPr/>
+        </p:nvSpPr>
+        <p:spPr>
+          <a:xfrm>
+            <a:off x="21666200" y="15872380"/>
+            <a:ext cx="467286" cy="275670"/>
+          </a:xfrm>
+          <a:prstGeom prst="rect">
+            <a:avLst/>
+          </a:prstGeom>
+          <a:noFill/>
+          <a:ln w="28575">
+            <a:solidFill>
+              <a:srgbClr val="FF0000"/>
+            </a:solidFill>
+          </a:ln>
+        </p:spPr>
+        <p:style>
+          <a:lnRef idx="2">
+            <a:schemeClr val="accent1">
+              <a:shade val="50000"/>
+            </a:schemeClr>
+          </a:lnRef>
+          <a:fillRef idx="1">
+            <a:schemeClr val="accent1"/>
+          </a:fillRef>
+          <a:effectRef idx="0">
+            <a:schemeClr val="accent1"/>
+          </a:effectRef>
+          <a:fontRef idx="minor">
+            <a:schemeClr val="lt1"/>
+          </a:fontRef>
+        </p:style>
+        <p:txBody>
+          <a:bodyPr rtlCol="0" anchor="ctr"/>
+          <a:lstStyle/>
+          <a:p>
+            <a:pPr algn="ctr"/>
+            <a:endParaRPr lang="en-US"/>
+          </a:p>
+        </p:txBody>
+      </p:sp>
+      <p:sp>
+        <p:nvSpPr>
+          <p:cNvPr id="38" name="Rectangle 37">
+            <a:extLst>
+              <a:ext uri="{FF2B5EF4-FFF2-40B4-BE49-F238E27FC236}">
+                <a16:creationId xmlns:a16="http://schemas.microsoft.com/office/drawing/2014/main" xmlns="" id="{DC05FE4E-0F33-451C-BE2D-F68CAB9E3927}"/>
+              </a:ext>
+            </a:extLst>
+          </p:cNvPr>
+          <p:cNvSpPr/>
+          <p:nvPr/>
+        </p:nvSpPr>
+        <p:spPr>
+          <a:xfrm>
+            <a:off x="17409607" y="15872380"/>
+            <a:ext cx="410585" cy="275670"/>
+          </a:xfrm>
+          <a:prstGeom prst="rect">
+            <a:avLst/>
+          </a:prstGeom>
+          <a:noFill/>
+          <a:ln w="28575">
+            <a:solidFill>
+              <a:srgbClr val="7030A0"/>
+            </a:solidFill>
+          </a:ln>
+        </p:spPr>
+        <p:style>
+          <a:lnRef idx="2">
+            <a:schemeClr val="accent1">
+              <a:shade val="50000"/>
+            </a:schemeClr>
+          </a:lnRef>
+          <a:fillRef idx="1">
+            <a:schemeClr val="accent1"/>
+          </a:fillRef>
+          <a:effectRef idx="0">
+            <a:schemeClr val="accent1"/>
+          </a:effectRef>
+          <a:fontRef idx="minor">
+            <a:schemeClr val="lt1"/>
+          </a:fontRef>
+        </p:style>
+        <p:txBody>
+          <a:bodyPr rtlCol="0" anchor="ctr"/>
+          <a:lstStyle/>
+          <a:p>
+            <a:pPr algn="ctr"/>
+            <a:endParaRPr lang="en-US"/>
+          </a:p>
+        </p:txBody>
+      </p:sp>
+      <p:sp>
+        <p:nvSpPr>
+          <p:cNvPr id="39" name="Rectangle 38">
+            <a:extLst>
+              <a:ext uri="{FF2B5EF4-FFF2-40B4-BE49-F238E27FC236}">
+                <a16:creationId xmlns:a16="http://schemas.microsoft.com/office/drawing/2014/main" xmlns="" id="{5EAA354B-40E1-4AC5-AAD4-DAFEFE09C5B4}"/>
+              </a:ext>
+            </a:extLst>
+          </p:cNvPr>
+          <p:cNvSpPr/>
+          <p:nvPr/>
+        </p:nvSpPr>
+        <p:spPr>
+          <a:xfrm>
+            <a:off x="20191736" y="14027150"/>
+            <a:ext cx="387350" cy="209550"/>
+          </a:xfrm>
+          <a:prstGeom prst="rect">
+            <a:avLst/>
+          </a:prstGeom>
+          <a:noFill/>
+          <a:ln w="28575">
+            <a:solidFill>
+              <a:srgbClr val="FFC000"/>
+            </a:solidFill>
+          </a:ln>
+        </p:spPr>
+        <p:style>
+          <a:lnRef idx="2">
+            <a:schemeClr val="accent1">
+              <a:shade val="50000"/>
+            </a:schemeClr>
+          </a:lnRef>
+          <a:fillRef idx="1">
+            <a:schemeClr val="accent1"/>
+          </a:fillRef>
+          <a:effectRef idx="0">
+            <a:schemeClr val="accent1"/>
+          </a:effectRef>
+          <a:fontRef idx="minor">
+            <a:schemeClr val="lt1"/>
+          </a:fontRef>
+        </p:style>
+        <p:txBody>
+          <a:bodyPr rtlCol="0" anchor="ctr"/>
+          <a:lstStyle/>
+          <a:p>
+            <a:pPr algn="ctr"/>
+            <a:endParaRPr lang="en-US"/>
+          </a:p>
+        </p:txBody>
+      </p:sp>
+      <p:sp>
+        <p:nvSpPr>
+          <p:cNvPr id="3" name="Rectangle 2">
+            <a:extLst>
+              <a:ext uri="{FF2B5EF4-FFF2-40B4-BE49-F238E27FC236}">
+                <a16:creationId xmlns:a16="http://schemas.microsoft.com/office/drawing/2014/main" xmlns="" id="{D630FAD8-314F-487B-9424-B77500CC7CCB}"/>
+              </a:ext>
+            </a:extLst>
+          </p:cNvPr>
+          <p:cNvSpPr/>
+          <p:nvPr/>
+        </p:nvSpPr>
+        <p:spPr>
+          <a:xfrm>
+            <a:off x="1850065" y="32514363"/>
+            <a:ext cx="2150428" cy="1041990"/>
+          </a:xfrm>
+          <a:prstGeom prst="rect">
+            <a:avLst/>
+          </a:prstGeom>
+          <a:noFill/>
+          <a:ln w="76200">
+            <a:solidFill>
+              <a:srgbClr val="FF0000"/>
+            </a:solidFill>
+          </a:ln>
+        </p:spPr>
+        <p:style>
+          <a:lnRef idx="2">
+            <a:schemeClr val="accent1">
+              <a:shade val="50000"/>
+            </a:schemeClr>
+          </a:lnRef>
+          <a:fillRef idx="1">
+            <a:schemeClr val="accent1"/>
+          </a:fillRef>
+          <a:effectRef idx="0">
+            <a:schemeClr val="accent1"/>
+          </a:effectRef>
+          <a:fontRef idx="minor">
+            <a:schemeClr val="lt1"/>
+          </a:fontRef>
+        </p:style>
+        <p:txBody>
+          <a:bodyPr rtlCol="0" anchor="ctr"/>
+          <a:lstStyle/>
+          <a:p>
+            <a:pPr algn="ctr"/>
+            <a:endParaRPr lang="en-US"/>
+          </a:p>
+        </p:txBody>
+      </p:sp>
+      <p:sp>
+        <p:nvSpPr>
+          <p:cNvPr id="40" name="Rectangle 39">
+            <a:extLst>
+              <a:ext uri="{FF2B5EF4-FFF2-40B4-BE49-F238E27FC236}">
+                <a16:creationId xmlns:a16="http://schemas.microsoft.com/office/drawing/2014/main" xmlns="" id="{F6D6507F-BBE8-4B10-9C68-DE704305B505}"/>
+              </a:ext>
+            </a:extLst>
+          </p:cNvPr>
+          <p:cNvSpPr/>
+          <p:nvPr/>
+        </p:nvSpPr>
+        <p:spPr>
+          <a:xfrm>
+            <a:off x="4777835" y="35171262"/>
+            <a:ext cx="2150428" cy="1041990"/>
+          </a:xfrm>
+          <a:prstGeom prst="rect">
+            <a:avLst/>
+          </a:prstGeom>
+          <a:noFill/>
+          <a:ln w="76200">
+            <a:solidFill>
+              <a:srgbClr val="7030A0"/>
+            </a:solidFill>
+          </a:ln>
+        </p:spPr>
+        <p:style>
+          <a:lnRef idx="2">
+            <a:schemeClr val="accent1">
+              <a:shade val="50000"/>
+            </a:schemeClr>
+          </a:lnRef>
+          <a:fillRef idx="1">
+            <a:schemeClr val="accent1"/>
+          </a:fillRef>
+          <a:effectRef idx="0">
+            <a:schemeClr val="accent1"/>
+          </a:effectRef>
+          <a:fontRef idx="minor">
+            <a:schemeClr val="lt1"/>
+          </a:fontRef>
+        </p:style>
+        <p:txBody>
+          <a:bodyPr rtlCol="0" anchor="ctr"/>
+          <a:lstStyle/>
+          <a:p>
+            <a:pPr algn="ctr"/>
+            <a:endParaRPr lang="en-US"/>
+          </a:p>
+        </p:txBody>
+      </p:sp>
+      <p:sp>
+        <p:nvSpPr>
+          <p:cNvPr id="41" name="Rectangle 40">
+            <a:extLst>
+              <a:ext uri="{FF2B5EF4-FFF2-40B4-BE49-F238E27FC236}">
+                <a16:creationId xmlns:a16="http://schemas.microsoft.com/office/drawing/2014/main" xmlns="" id="{21FE9F22-C202-41DF-9304-52E2076E79B6}"/>
+              </a:ext>
+            </a:extLst>
+          </p:cNvPr>
+          <p:cNvSpPr/>
+          <p:nvPr/>
+        </p:nvSpPr>
+        <p:spPr>
+          <a:xfrm>
+            <a:off x="4777835" y="33890107"/>
+            <a:ext cx="2150428" cy="974651"/>
+          </a:xfrm>
+          <a:prstGeom prst="rect">
+            <a:avLst/>
+          </a:prstGeom>
+          <a:noFill/>
+          <a:ln w="76200">
+            <a:solidFill>
+              <a:srgbClr val="00B050"/>
+            </a:solidFill>
+          </a:ln>
+        </p:spPr>
+        <p:style>
+          <a:lnRef idx="2">
+            <a:schemeClr val="accent1">
+              <a:shade val="50000"/>
+            </a:schemeClr>
+          </a:lnRef>
+          <a:fillRef idx="1">
+            <a:schemeClr val="accent1"/>
+          </a:fillRef>
+          <a:effectRef idx="0">
+            <a:schemeClr val="accent1"/>
+          </a:effectRef>
+          <a:fontRef idx="minor">
+            <a:schemeClr val="lt1"/>
+          </a:fontRef>
+        </p:style>
+        <p:txBody>
+          <a:bodyPr rtlCol="0" anchor="ctr"/>
+          <a:lstStyle/>
+          <a:p>
+            <a:pPr algn="ctr"/>
+            <a:endParaRPr lang="en-US"/>
+          </a:p>
+        </p:txBody>
+      </p:sp>
+      <p:sp>
+        <p:nvSpPr>
+          <p:cNvPr id="42" name="Rectangle 41">
+            <a:extLst>
+              <a:ext uri="{FF2B5EF4-FFF2-40B4-BE49-F238E27FC236}">
+                <a16:creationId xmlns:a16="http://schemas.microsoft.com/office/drawing/2014/main" xmlns="" id="{AA8220AA-C695-4DF7-9CFA-3BE8BC7A0FD6}"/>
+              </a:ext>
+            </a:extLst>
+          </p:cNvPr>
+          <p:cNvSpPr/>
+          <p:nvPr/>
+        </p:nvSpPr>
+        <p:spPr>
+          <a:xfrm>
+            <a:off x="4777835" y="32566667"/>
+            <a:ext cx="2150428" cy="1053481"/>
+          </a:xfrm>
+          <a:prstGeom prst="rect">
+            <a:avLst/>
+          </a:prstGeom>
+          <a:noFill/>
+          <a:ln w="76200">
+            <a:solidFill>
+              <a:srgbClr val="FF0000"/>
+            </a:solidFill>
+          </a:ln>
+        </p:spPr>
+        <p:style>
+          <a:lnRef idx="2">
+            <a:schemeClr val="accent1">
+              <a:shade val="50000"/>
+            </a:schemeClr>
+          </a:lnRef>
+          <a:fillRef idx="1">
+            <a:schemeClr val="accent1"/>
+          </a:fillRef>
+          <a:effectRef idx="0">
+            <a:schemeClr val="accent1"/>
+          </a:effectRef>
+          <a:fontRef idx="minor">
+            <a:schemeClr val="lt1"/>
+          </a:fontRef>
+        </p:style>
+        <p:txBody>
+          <a:bodyPr rtlCol="0" anchor="ctr"/>
+          <a:lstStyle/>
+          <a:p>
+            <a:pPr algn="ctr"/>
+            <a:endParaRPr lang="en-US"/>
+          </a:p>
+        </p:txBody>
+      </p:sp>
+      <p:sp>
+        <p:nvSpPr>
+          <p:cNvPr id="43" name="Rectangle 42">
+            <a:extLst>
+              <a:ext uri="{FF2B5EF4-FFF2-40B4-BE49-F238E27FC236}">
+                <a16:creationId xmlns:a16="http://schemas.microsoft.com/office/drawing/2014/main" xmlns="" id="{31F54505-5323-4889-B422-CE71879041F3}"/>
+              </a:ext>
+            </a:extLst>
+          </p:cNvPr>
+          <p:cNvSpPr/>
+          <p:nvPr/>
+        </p:nvSpPr>
+        <p:spPr>
+          <a:xfrm>
+            <a:off x="1903780" y="33822768"/>
+            <a:ext cx="2117661" cy="1041990"/>
+          </a:xfrm>
+          <a:prstGeom prst="rect">
+            <a:avLst/>
+          </a:prstGeom>
+          <a:noFill/>
+          <a:ln w="76200">
+            <a:solidFill>
+              <a:srgbClr val="00B050"/>
+            </a:solidFill>
+          </a:ln>
+        </p:spPr>
+        <p:style>
+          <a:lnRef idx="2">
+            <a:schemeClr val="accent1">
+              <a:shade val="50000"/>
+            </a:schemeClr>
+          </a:lnRef>
+          <a:fillRef idx="1">
+            <a:schemeClr val="accent1"/>
+          </a:fillRef>
+          <a:effectRef idx="0">
+            <a:schemeClr val="accent1"/>
+          </a:effectRef>
+          <a:fontRef idx="minor">
+            <a:schemeClr val="lt1"/>
+          </a:fontRef>
+        </p:style>
+        <p:txBody>
+          <a:bodyPr rtlCol="0" anchor="ctr"/>
+          <a:lstStyle/>
+          <a:p>
+            <a:pPr algn="ctr"/>
+            <a:endParaRPr lang="en-US"/>
+          </a:p>
+        </p:txBody>
+      </p:sp>
+      <p:sp>
+        <p:nvSpPr>
+          <p:cNvPr id="44" name="Rectangle 43">
+            <a:extLst>
+              <a:ext uri="{FF2B5EF4-FFF2-40B4-BE49-F238E27FC236}">
+                <a16:creationId xmlns:a16="http://schemas.microsoft.com/office/drawing/2014/main" xmlns="" id="{03D23D9F-752B-40AF-8FAC-1B64C13D71F8}"/>
+              </a:ext>
+            </a:extLst>
+          </p:cNvPr>
+          <p:cNvSpPr/>
+          <p:nvPr/>
+        </p:nvSpPr>
+        <p:spPr>
+          <a:xfrm>
+            <a:off x="1850065" y="35129329"/>
+            <a:ext cx="2150428" cy="1041990"/>
+          </a:xfrm>
+          <a:prstGeom prst="rect">
+            <a:avLst/>
+          </a:prstGeom>
+          <a:noFill/>
+          <a:ln w="76200">
+            <a:solidFill>
+              <a:srgbClr val="7030A0"/>
+            </a:solidFill>
+          </a:ln>
+        </p:spPr>
+        <p:style>
+          <a:lnRef idx="2">
+            <a:schemeClr val="accent1">
+              <a:shade val="50000"/>
+            </a:schemeClr>
+          </a:lnRef>
+          <a:fillRef idx="1">
+            <a:schemeClr val="accent1"/>
+          </a:fillRef>
+          <a:effectRef idx="0">
+            <a:schemeClr val="accent1"/>
+          </a:effectRef>
+          <a:fontRef idx="minor">
+            <a:schemeClr val="lt1"/>
+          </a:fontRef>
+        </p:style>
+        <p:txBody>
+          <a:bodyPr rtlCol="0" anchor="ctr"/>
+          <a:lstStyle/>
+          <a:p>
+            <a:pPr algn="ctr"/>
+            <a:endParaRPr lang="en-US"/>
+          </a:p>
+        </p:txBody>
+      </p:sp>
+      <p:cxnSp>
+        <p:nvCxnSpPr>
+          <p:cNvPr id="15" name="Straight Connector 14">
+            <a:extLst>
+              <a:ext uri="{FF2B5EF4-FFF2-40B4-BE49-F238E27FC236}">
+                <a16:creationId xmlns:a16="http://schemas.microsoft.com/office/drawing/2014/main" xmlns="" id="{BE03DF03-77DF-4F0E-818A-23366A1BC896}"/>
+              </a:ext>
+            </a:extLst>
+          </p:cNvPr>
+          <p:cNvCxnSpPr>
+            <a:cxnSpLocks/>
+          </p:cNvCxnSpPr>
+          <p:nvPr/>
+        </p:nvCxnSpPr>
+        <p:spPr>
+          <a:xfrm>
+            <a:off x="7571375" y="32566667"/>
+            <a:ext cx="2210578" cy="0"/>
+          </a:xfrm>
+          <a:prstGeom prst="line">
+            <a:avLst/>
+          </a:prstGeom>
+          <a:ln w="76200">
+            <a:solidFill>
+              <a:srgbClr val="FF0000"/>
+            </a:solidFill>
+          </a:ln>
+        </p:spPr>
+        <p:style>
+          <a:lnRef idx="1">
+            <a:schemeClr val="accent1"/>
+          </a:lnRef>
+          <a:fillRef idx="0">
+            <a:schemeClr val="accent1"/>
+          </a:fillRef>
+          <a:effectRef idx="0">
+            <a:schemeClr val="accent1"/>
+          </a:effectRef>
+          <a:fontRef idx="minor">
+            <a:schemeClr val="tx1"/>
+          </a:fontRef>
+        </p:style>
+      </p:cxnSp>
+      <p:cxnSp>
+        <p:nvCxnSpPr>
+          <p:cNvPr id="45" name="Straight Connector 44">
+            <a:extLst>
+              <a:ext uri="{FF2B5EF4-FFF2-40B4-BE49-F238E27FC236}">
+                <a16:creationId xmlns:a16="http://schemas.microsoft.com/office/drawing/2014/main" xmlns="" id="{1BB4924B-8717-4BED-AA62-4E28AAF970C0}"/>
+              </a:ext>
+            </a:extLst>
+          </p:cNvPr>
+          <p:cNvCxnSpPr>
+            <a:cxnSpLocks/>
+          </p:cNvCxnSpPr>
+          <p:nvPr/>
+        </p:nvCxnSpPr>
+        <p:spPr>
+          <a:xfrm>
+            <a:off x="9781953" y="32514363"/>
+            <a:ext cx="0" cy="1041990"/>
+          </a:xfrm>
+          <a:prstGeom prst="line">
+            <a:avLst/>
+          </a:prstGeom>
+          <a:ln w="76200">
+            <a:solidFill>
+              <a:srgbClr val="00B050"/>
+            </a:solidFill>
+          </a:ln>
+        </p:spPr>
+        <p:style>
+          <a:lnRef idx="1">
+            <a:schemeClr val="accent1"/>
+          </a:lnRef>
+          <a:fillRef idx="0">
+            <a:schemeClr val="accent1"/>
+          </a:fillRef>
+          <a:effectRef idx="0">
+            <a:schemeClr val="accent1"/>
+          </a:effectRef>
+          <a:fontRef idx="minor">
+            <a:schemeClr val="tx1"/>
+          </a:fontRef>
+        </p:style>
+      </p:cxnSp>
+      <p:cxnSp>
+        <p:nvCxnSpPr>
+          <p:cNvPr id="49" name="Straight Connector 48">
+            <a:extLst>
+              <a:ext uri="{FF2B5EF4-FFF2-40B4-BE49-F238E27FC236}">
+                <a16:creationId xmlns:a16="http://schemas.microsoft.com/office/drawing/2014/main" xmlns="" id="{5A0C5206-1B45-4610-8490-F5E0D617BAB9}"/>
+              </a:ext>
+            </a:extLst>
+          </p:cNvPr>
+          <p:cNvCxnSpPr>
+            <a:cxnSpLocks/>
+          </p:cNvCxnSpPr>
+          <p:nvPr/>
+        </p:nvCxnSpPr>
+        <p:spPr>
+          <a:xfrm>
+            <a:off x="7571375" y="33556353"/>
+            <a:ext cx="2210578" cy="0"/>
+          </a:xfrm>
+          <a:prstGeom prst="line">
+            <a:avLst/>
+          </a:prstGeom>
+          <a:ln w="76200">
+            <a:solidFill>
+              <a:srgbClr val="00B050"/>
+            </a:solidFill>
+          </a:ln>
+        </p:spPr>
+        <p:style>
+          <a:lnRef idx="1">
+            <a:schemeClr val="accent1"/>
+          </a:lnRef>
+          <a:fillRef idx="0">
+            <a:schemeClr val="accent1"/>
+          </a:fillRef>
+          <a:effectRef idx="0">
+            <a:schemeClr val="accent1"/>
+          </a:effectRef>
+          <a:fontRef idx="minor">
+            <a:schemeClr val="tx1"/>
+          </a:fontRef>
+        </p:style>
+      </p:cxnSp>
+      <p:cxnSp>
+        <p:nvCxnSpPr>
+          <p:cNvPr id="50" name="Straight Connector 49">
+            <a:extLst>
+              <a:ext uri="{FF2B5EF4-FFF2-40B4-BE49-F238E27FC236}">
+                <a16:creationId xmlns:a16="http://schemas.microsoft.com/office/drawing/2014/main" xmlns="" id="{75C92047-DDC0-4A88-AAEE-B23CE810672A}"/>
+              </a:ext>
+            </a:extLst>
+          </p:cNvPr>
+          <p:cNvCxnSpPr>
+            <a:cxnSpLocks/>
+          </p:cNvCxnSpPr>
+          <p:nvPr/>
+        </p:nvCxnSpPr>
+        <p:spPr>
+          <a:xfrm>
+            <a:off x="7571375" y="32514363"/>
+            <a:ext cx="0" cy="1041990"/>
+          </a:xfrm>
+          <a:prstGeom prst="line">
+            <a:avLst/>
+          </a:prstGeom>
+          <a:ln w="76200">
+            <a:solidFill>
+              <a:srgbClr val="FF0000"/>
+            </a:solidFill>
+          </a:ln>
+        </p:spPr>
+        <p:style>
+          <a:lnRef idx="1">
+            <a:schemeClr val="accent1"/>
+          </a:lnRef>
+          <a:fillRef idx="0">
+            <a:schemeClr val="accent1"/>
+          </a:fillRef>
+          <a:effectRef idx="0">
+            <a:schemeClr val="accent1"/>
+          </a:effectRef>
+          <a:fontRef idx="minor">
+            <a:schemeClr val="tx1"/>
+          </a:fontRef>
+        </p:style>
+      </p:cxnSp>
+      <p:cxnSp>
+        <p:nvCxnSpPr>
+          <p:cNvPr id="53" name="Straight Connector 52">
+            <a:extLst>
+              <a:ext uri="{FF2B5EF4-FFF2-40B4-BE49-F238E27FC236}">
+                <a16:creationId xmlns:a16="http://schemas.microsoft.com/office/drawing/2014/main" xmlns="" id="{9AD50E1F-4CEF-4B20-85C2-8C962F320FCD}"/>
+              </a:ext>
+            </a:extLst>
+          </p:cNvPr>
+          <p:cNvCxnSpPr>
+            <a:cxnSpLocks/>
+          </p:cNvCxnSpPr>
+          <p:nvPr/>
+        </p:nvCxnSpPr>
+        <p:spPr>
+          <a:xfrm>
+            <a:off x="7593385" y="37184742"/>
+            <a:ext cx="2210578" cy="0"/>
+          </a:xfrm>
+          <a:prstGeom prst="line">
+            <a:avLst/>
+          </a:prstGeom>
+          <a:ln w="76200">
+            <a:solidFill>
+              <a:srgbClr val="FF0000"/>
+            </a:solidFill>
+          </a:ln>
+        </p:spPr>
+        <p:style>
+          <a:lnRef idx="1">
+            <a:schemeClr val="accent1"/>
+          </a:lnRef>
+          <a:fillRef idx="0">
+            <a:schemeClr val="accent1"/>
+          </a:fillRef>
+          <a:effectRef idx="0">
+            <a:schemeClr val="accent1"/>
+          </a:effectRef>
+          <a:fontRef idx="minor">
+            <a:schemeClr val="tx1"/>
+          </a:fontRef>
+        </p:style>
+      </p:cxnSp>
+      <p:cxnSp>
+        <p:nvCxnSpPr>
+          <p:cNvPr id="54" name="Straight Connector 53">
+            <a:extLst>
+              <a:ext uri="{FF2B5EF4-FFF2-40B4-BE49-F238E27FC236}">
+                <a16:creationId xmlns:a16="http://schemas.microsoft.com/office/drawing/2014/main" xmlns="" id="{5E7C2194-506D-4390-B20D-2619A240E4A4}"/>
+              </a:ext>
+            </a:extLst>
+          </p:cNvPr>
+          <p:cNvCxnSpPr>
+            <a:cxnSpLocks/>
+          </p:cNvCxnSpPr>
+          <p:nvPr/>
+        </p:nvCxnSpPr>
+        <p:spPr>
+          <a:xfrm>
+            <a:off x="7571375" y="36171319"/>
+            <a:ext cx="2210578" cy="0"/>
+          </a:xfrm>
+          <a:prstGeom prst="line">
+            <a:avLst/>
+          </a:prstGeom>
+          <a:ln w="76200">
+            <a:solidFill>
+              <a:srgbClr val="7030A0"/>
+            </a:solidFill>
+          </a:ln>
+        </p:spPr>
+        <p:style>
+          <a:lnRef idx="1">
+            <a:schemeClr val="accent1"/>
+          </a:lnRef>
+          <a:fillRef idx="0">
+            <a:schemeClr val="accent1"/>
+          </a:fillRef>
+          <a:effectRef idx="0">
+            <a:schemeClr val="accent1"/>
+          </a:effectRef>
+          <a:fontRef idx="minor">
+            <a:schemeClr val="tx1"/>
+          </a:fontRef>
+        </p:style>
+      </p:cxnSp>
+      <p:cxnSp>
+        <p:nvCxnSpPr>
+          <p:cNvPr id="55" name="Straight Connector 54">
+            <a:extLst>
+              <a:ext uri="{FF2B5EF4-FFF2-40B4-BE49-F238E27FC236}">
+                <a16:creationId xmlns:a16="http://schemas.microsoft.com/office/drawing/2014/main" xmlns="" id="{F0AF953E-4151-4FCB-BB6C-266E84EFB915}"/>
+              </a:ext>
+            </a:extLst>
+          </p:cNvPr>
+          <p:cNvCxnSpPr>
+            <a:cxnSpLocks/>
+          </p:cNvCxnSpPr>
+          <p:nvPr/>
+        </p:nvCxnSpPr>
+        <p:spPr>
+          <a:xfrm>
+            <a:off x="7631874" y="35384295"/>
+            <a:ext cx="2210578" cy="0"/>
+          </a:xfrm>
+          <a:prstGeom prst="line">
+            <a:avLst/>
+          </a:prstGeom>
+          <a:ln w="76200">
+            <a:solidFill>
+              <a:srgbClr val="FF0000"/>
+            </a:solidFill>
+          </a:ln>
+        </p:spPr>
+        <p:style>
+          <a:lnRef idx="1">
+            <a:schemeClr val="accent1"/>
+          </a:lnRef>
+          <a:fillRef idx="0">
+            <a:schemeClr val="accent1"/>
+          </a:fillRef>
+          <a:effectRef idx="0">
+            <a:schemeClr val="accent1"/>
+          </a:effectRef>
+          <a:fontRef idx="minor">
+            <a:schemeClr val="tx1"/>
+          </a:fontRef>
+        </p:style>
+      </p:cxnSp>
+      <p:cxnSp>
+        <p:nvCxnSpPr>
+          <p:cNvPr id="56" name="Straight Connector 55">
+            <a:extLst>
+              <a:ext uri="{FF2B5EF4-FFF2-40B4-BE49-F238E27FC236}">
+                <a16:creationId xmlns:a16="http://schemas.microsoft.com/office/drawing/2014/main" xmlns="" id="{D7C019B6-A4E0-499C-85CA-64C5ADDFAB60}"/>
+              </a:ext>
+            </a:extLst>
+          </p:cNvPr>
+          <p:cNvCxnSpPr>
+            <a:cxnSpLocks/>
+          </p:cNvCxnSpPr>
+          <p:nvPr/>
+        </p:nvCxnSpPr>
+        <p:spPr>
+          <a:xfrm>
+            <a:off x="7692374" y="34422648"/>
+            <a:ext cx="2089579" cy="0"/>
+          </a:xfrm>
+          <a:prstGeom prst="line">
+            <a:avLst/>
+          </a:prstGeom>
+          <a:ln w="76200">
+            <a:solidFill>
+              <a:srgbClr val="00B050"/>
+            </a:solidFill>
+          </a:ln>
+        </p:spPr>
+        <p:style>
+          <a:lnRef idx="1">
+            <a:schemeClr val="accent1"/>
+          </a:lnRef>
+          <a:fillRef idx="0">
+            <a:schemeClr val="accent1"/>
+          </a:fillRef>
+          <a:effectRef idx="0">
+            <a:schemeClr val="accent1"/>
+          </a:effectRef>
+          <a:fontRef idx="minor">
+            <a:schemeClr val="tx1"/>
+          </a:fontRef>
+        </p:style>
+      </p:cxnSp>
+      <p:cxnSp>
+        <p:nvCxnSpPr>
+          <p:cNvPr id="58" name="Straight Connector 57">
+            <a:extLst>
+              <a:ext uri="{FF2B5EF4-FFF2-40B4-BE49-F238E27FC236}">
+                <a16:creationId xmlns:a16="http://schemas.microsoft.com/office/drawing/2014/main" xmlns="" id="{C9570E71-9947-4D6E-AA99-D8B66607778F}"/>
+              </a:ext>
+            </a:extLst>
+          </p:cNvPr>
+          <p:cNvCxnSpPr>
+            <a:cxnSpLocks/>
+          </p:cNvCxnSpPr>
+          <p:nvPr/>
+        </p:nvCxnSpPr>
+        <p:spPr>
+          <a:xfrm>
+            <a:off x="9781953" y="36142752"/>
+            <a:ext cx="0" cy="1041990"/>
+          </a:xfrm>
+          <a:prstGeom prst="line">
+            <a:avLst/>
+          </a:prstGeom>
+          <a:ln w="76200">
+            <a:solidFill>
+              <a:srgbClr val="FF0000"/>
+            </a:solidFill>
+          </a:ln>
+        </p:spPr>
+        <p:style>
+          <a:lnRef idx="1">
+            <a:schemeClr val="accent1"/>
+          </a:lnRef>
+          <a:fillRef idx="0">
+            <a:schemeClr val="accent1"/>
+          </a:fillRef>
+          <a:effectRef idx="0">
+            <a:schemeClr val="accent1"/>
+          </a:effectRef>
+          <a:fontRef idx="minor">
+            <a:schemeClr val="tx1"/>
+          </a:fontRef>
+        </p:style>
+      </p:cxnSp>
+      <p:cxnSp>
+        <p:nvCxnSpPr>
+          <p:cNvPr id="59" name="Straight Connector 58">
+            <a:extLst>
+              <a:ext uri="{FF2B5EF4-FFF2-40B4-BE49-F238E27FC236}">
+                <a16:creationId xmlns:a16="http://schemas.microsoft.com/office/drawing/2014/main" xmlns="" id="{C7F98DBC-7B52-4235-9FAA-EDDC11055BD9}"/>
+              </a:ext>
+            </a:extLst>
+          </p:cNvPr>
+          <p:cNvCxnSpPr>
+            <a:cxnSpLocks/>
+          </p:cNvCxnSpPr>
+          <p:nvPr/>
+        </p:nvCxnSpPr>
+        <p:spPr>
+          <a:xfrm>
+            <a:off x="7631874" y="36171319"/>
+            <a:ext cx="0" cy="1041990"/>
+          </a:xfrm>
+          <a:prstGeom prst="line">
+            <a:avLst/>
+          </a:prstGeom>
+          <a:ln w="76200">
+            <a:solidFill>
+              <a:srgbClr val="7030A0"/>
+            </a:solidFill>
+          </a:ln>
+        </p:spPr>
+        <p:style>
+          <a:lnRef idx="1">
+            <a:schemeClr val="accent1"/>
+          </a:lnRef>
+          <a:fillRef idx="0">
+            <a:schemeClr val="accent1"/>
+          </a:fillRef>
+          <a:effectRef idx="0">
+            <a:schemeClr val="accent1"/>
+          </a:effectRef>
+          <a:fontRef idx="minor">
+            <a:schemeClr val="tx1"/>
+          </a:fontRef>
+        </p:style>
+      </p:cxnSp>
+      <p:cxnSp>
+        <p:nvCxnSpPr>
+          <p:cNvPr id="60" name="Straight Connector 59">
+            <a:extLst>
+              <a:ext uri="{FF2B5EF4-FFF2-40B4-BE49-F238E27FC236}">
+                <a16:creationId xmlns:a16="http://schemas.microsoft.com/office/drawing/2014/main" xmlns="" id="{F9B17199-6C20-419F-8FD3-2BCEE986BF74}"/>
+              </a:ext>
+            </a:extLst>
+          </p:cNvPr>
+          <p:cNvCxnSpPr>
+            <a:cxnSpLocks/>
+          </p:cNvCxnSpPr>
+          <p:nvPr/>
+        </p:nvCxnSpPr>
+        <p:spPr>
+          <a:xfrm>
+            <a:off x="7692374" y="34398054"/>
+            <a:ext cx="0" cy="1041990"/>
+          </a:xfrm>
+          <a:prstGeom prst="line">
+            <a:avLst/>
+          </a:prstGeom>
+          <a:ln w="76200">
+            <a:solidFill>
+              <a:srgbClr val="00B050"/>
+            </a:solidFill>
+          </a:ln>
+        </p:spPr>
+        <p:style>
+          <a:lnRef idx="1">
+            <a:schemeClr val="accent1"/>
+          </a:lnRef>
+          <a:fillRef idx="0">
+            <a:schemeClr val="accent1"/>
+          </a:fillRef>
+          <a:effectRef idx="0">
+            <a:schemeClr val="accent1"/>
+          </a:effectRef>
+          <a:fontRef idx="minor">
+            <a:schemeClr val="tx1"/>
+          </a:fontRef>
+        </p:style>
+      </p:cxnSp>
+      <p:cxnSp>
+        <p:nvCxnSpPr>
+          <p:cNvPr id="61" name="Straight Connector 60">
+            <a:extLst>
+              <a:ext uri="{FF2B5EF4-FFF2-40B4-BE49-F238E27FC236}">
+                <a16:creationId xmlns:a16="http://schemas.microsoft.com/office/drawing/2014/main" xmlns="" id="{4DD65367-1B7F-42CF-B0E2-30BCE69B9449}"/>
+              </a:ext>
+            </a:extLst>
+          </p:cNvPr>
+          <p:cNvCxnSpPr>
+            <a:cxnSpLocks/>
+          </p:cNvCxnSpPr>
+          <p:nvPr/>
+        </p:nvCxnSpPr>
+        <p:spPr>
+          <a:xfrm>
+            <a:off x="9803963" y="34377432"/>
+            <a:ext cx="0" cy="1041990"/>
+          </a:xfrm>
+          <a:prstGeom prst="line">
+            <a:avLst/>
+          </a:prstGeom>
+          <a:ln w="76200">
+            <a:solidFill>
+              <a:srgbClr val="FF0000"/>
+            </a:solidFill>
+          </a:ln>
+        </p:spPr>
+        <p:style>
+          <a:lnRef idx="1">
+            <a:schemeClr val="accent1"/>
+          </a:lnRef>
+          <a:fillRef idx="0">
+            <a:schemeClr val="accent1"/>
+          </a:fillRef>
+          <a:effectRef idx="0">
+            <a:schemeClr val="accent1"/>
+          </a:effectRef>
+          <a:fontRef idx="minor">
+            <a:schemeClr val="tx1"/>
+          </a:fontRef>
+        </p:style>
+      </p:cxnSp>
+      <p:cxnSp>
+        <p:nvCxnSpPr>
+          <p:cNvPr id="63" name="Straight Connector 62">
+            <a:extLst>
+              <a:ext uri="{FF2B5EF4-FFF2-40B4-BE49-F238E27FC236}">
+                <a16:creationId xmlns:a16="http://schemas.microsoft.com/office/drawing/2014/main" xmlns="" id="{27786E25-F695-4F2D-A906-6C5D45F48170}"/>
+              </a:ext>
+            </a:extLst>
+          </p:cNvPr>
+          <p:cNvCxnSpPr>
+            <a:cxnSpLocks/>
+          </p:cNvCxnSpPr>
+          <p:nvPr/>
+        </p:nvCxnSpPr>
+        <p:spPr>
+          <a:xfrm>
+            <a:off x="11284039" y="34095067"/>
+            <a:ext cx="2112984" cy="0"/>
+          </a:xfrm>
+          <a:prstGeom prst="line">
+            <a:avLst/>
+          </a:prstGeom>
+          <a:ln w="76200">
+            <a:solidFill>
+              <a:srgbClr val="7030A0"/>
+            </a:solidFill>
+          </a:ln>
+        </p:spPr>
+        <p:style>
+          <a:lnRef idx="1">
+            <a:schemeClr val="accent1"/>
+          </a:lnRef>
+          <a:fillRef idx="0">
+            <a:schemeClr val="accent1"/>
+          </a:fillRef>
+          <a:effectRef idx="0">
+            <a:schemeClr val="accent1"/>
+          </a:effectRef>
+          <a:fontRef idx="minor">
+            <a:schemeClr val="tx1"/>
+          </a:fontRef>
+        </p:style>
+      </p:cxnSp>
+      <p:cxnSp>
+        <p:nvCxnSpPr>
+          <p:cNvPr id="65" name="Straight Connector 64">
+            <a:extLst>
+              <a:ext uri="{FF2B5EF4-FFF2-40B4-BE49-F238E27FC236}">
+                <a16:creationId xmlns:a16="http://schemas.microsoft.com/office/drawing/2014/main" xmlns="" id="{B4E836FF-1512-4982-8379-D016DBF262AF}"/>
+              </a:ext>
+            </a:extLst>
+          </p:cNvPr>
+          <p:cNvCxnSpPr>
+            <a:cxnSpLocks/>
+          </p:cNvCxnSpPr>
+          <p:nvPr/>
+        </p:nvCxnSpPr>
+        <p:spPr>
+          <a:xfrm>
+            <a:off x="11284039" y="35547366"/>
+            <a:ext cx="2112984" cy="0"/>
+          </a:xfrm>
+          <a:prstGeom prst="line">
+            <a:avLst/>
+          </a:prstGeom>
+          <a:ln w="76200">
+            <a:solidFill>
+              <a:srgbClr val="FF0000"/>
+            </a:solidFill>
+          </a:ln>
+        </p:spPr>
+        <p:style>
+          <a:lnRef idx="1">
+            <a:schemeClr val="accent1"/>
+          </a:lnRef>
+          <a:fillRef idx="0">
+            <a:schemeClr val="accent1"/>
+          </a:fillRef>
+          <a:effectRef idx="0">
+            <a:schemeClr val="accent1"/>
+          </a:effectRef>
+          <a:fontRef idx="minor">
+            <a:schemeClr val="tx1"/>
+          </a:fontRef>
+        </p:style>
+      </p:cxnSp>
+      <p:cxnSp>
+        <p:nvCxnSpPr>
+          <p:cNvPr id="67" name="Straight Connector 66">
+            <a:extLst>
+              <a:ext uri="{FF2B5EF4-FFF2-40B4-BE49-F238E27FC236}">
+                <a16:creationId xmlns:a16="http://schemas.microsoft.com/office/drawing/2014/main" xmlns="" id="{474F9DC3-EA8C-4A69-92BB-E43F8D606441}"/>
+              </a:ext>
+            </a:extLst>
+          </p:cNvPr>
+          <p:cNvCxnSpPr>
+            <a:cxnSpLocks/>
+          </p:cNvCxnSpPr>
+          <p:nvPr/>
+        </p:nvCxnSpPr>
+        <p:spPr>
+          <a:xfrm>
+            <a:off x="13397023" y="34043636"/>
+            <a:ext cx="0" cy="1503730"/>
+          </a:xfrm>
+          <a:prstGeom prst="line">
+            <a:avLst/>
+          </a:prstGeom>
+          <a:ln w="76200">
+            <a:solidFill>
+              <a:srgbClr val="00B050"/>
+            </a:solidFill>
+          </a:ln>
+        </p:spPr>
+        <p:style>
+          <a:lnRef idx="1">
+            <a:schemeClr val="accent1"/>
+          </a:lnRef>
+          <a:fillRef idx="0">
+            <a:schemeClr val="accent1"/>
+          </a:fillRef>
+          <a:effectRef idx="0">
+            <a:schemeClr val="accent1"/>
+          </a:effectRef>
+          <a:fontRef idx="minor">
+            <a:schemeClr val="tx1"/>
+          </a:fontRef>
+        </p:style>
+      </p:cxnSp>
+      <p:cxnSp>
+        <p:nvCxnSpPr>
+          <p:cNvPr id="70" name="Straight Connector 69">
+            <a:extLst>
+              <a:ext uri="{FF2B5EF4-FFF2-40B4-BE49-F238E27FC236}">
+                <a16:creationId xmlns:a16="http://schemas.microsoft.com/office/drawing/2014/main" xmlns="" id="{42528884-0898-4651-984D-3CF99F2FDFCC}"/>
+              </a:ext>
+            </a:extLst>
+          </p:cNvPr>
+          <p:cNvCxnSpPr>
+            <a:cxnSpLocks/>
+          </p:cNvCxnSpPr>
+          <p:nvPr/>
+        </p:nvCxnSpPr>
+        <p:spPr>
+          <a:xfrm>
+            <a:off x="11284039" y="34043636"/>
+            <a:ext cx="0" cy="1503730"/>
+          </a:xfrm>
+          <a:prstGeom prst="line">
+            <a:avLst/>
+          </a:prstGeom>
+          <a:ln w="76200">
+            <a:solidFill>
+              <a:srgbClr val="00B050"/>
+            </a:solidFill>
+          </a:ln>
+        </p:spPr>
+        <p:style>
+          <a:lnRef idx="1">
+            <a:schemeClr val="accent1"/>
+          </a:lnRef>
+          <a:fillRef idx="0">
+            <a:schemeClr val="accent1"/>
+          </a:fillRef>
+          <a:effectRef idx="0">
+            <a:schemeClr val="accent1"/>
+          </a:effectRef>
+          <a:fontRef idx="minor">
+            <a:schemeClr val="tx1"/>
+          </a:fontRef>
+        </p:style>
+      </p:cxnSp>
+      <p:cxnSp>
+        <p:nvCxnSpPr>
+          <p:cNvPr id="72" name="Straight Arrow Connector 71">
+            <a:extLst>
+              <a:ext uri="{FF2B5EF4-FFF2-40B4-BE49-F238E27FC236}">
+                <a16:creationId xmlns:a16="http://schemas.microsoft.com/office/drawing/2014/main" xmlns="" id="{AF827E31-9272-4031-9437-262DE57EA741}"/>
+              </a:ext>
+            </a:extLst>
+          </p:cNvPr>
+          <p:cNvCxnSpPr/>
+          <p:nvPr/>
+        </p:nvCxnSpPr>
+        <p:spPr>
+          <a:xfrm>
+            <a:off x="4021441" y="37958233"/>
+            <a:ext cx="987566" cy="0"/>
+          </a:xfrm>
+          <a:prstGeom prst="straightConnector1">
+            <a:avLst/>
+          </a:prstGeom>
+          <a:ln w="76200">
+            <a:solidFill>
+              <a:schemeClr val="accent6">
+                <a:lumMod val="50000"/>
+              </a:schemeClr>
+            </a:solidFill>
+            <a:tailEnd type="triangle"/>
+          </a:ln>
+        </p:spPr>
+        <p:style>
+          <a:lnRef idx="1">
+            <a:schemeClr val="accent1"/>
+          </a:lnRef>
+          <a:fillRef idx="0">
+            <a:schemeClr val="accent1"/>
+          </a:fillRef>
+          <a:effectRef idx="0">
+            <a:schemeClr val="accent1"/>
+          </a:effectRef>
+          <a:fontRef idx="minor">
+            <a:schemeClr val="tx1"/>
+          </a:fontRef>
+        </p:style>
+      </p:cxnSp>
+      <p:cxnSp>
+        <p:nvCxnSpPr>
+          <p:cNvPr id="73" name="Straight Arrow Connector 72">
+            <a:extLst>
+              <a:ext uri="{FF2B5EF4-FFF2-40B4-BE49-F238E27FC236}">
+                <a16:creationId xmlns:a16="http://schemas.microsoft.com/office/drawing/2014/main" xmlns="" id="{833DC4E3-AC53-4DDD-92AC-EE32607D8186}"/>
+              </a:ext>
+            </a:extLst>
+          </p:cNvPr>
+          <p:cNvCxnSpPr/>
+          <p:nvPr/>
+        </p:nvCxnSpPr>
+        <p:spPr>
+          <a:xfrm>
+            <a:off x="10131563" y="37958233"/>
+            <a:ext cx="987566" cy="0"/>
+          </a:xfrm>
+          <a:prstGeom prst="straightConnector1">
+            <a:avLst/>
+          </a:prstGeom>
+          <a:ln w="76200">
+            <a:solidFill>
+              <a:schemeClr val="accent6">
+                <a:lumMod val="50000"/>
+              </a:schemeClr>
+            </a:solidFill>
+            <a:tailEnd type="triangle"/>
+          </a:ln>
+        </p:spPr>
+        <p:style>
+          <a:lnRef idx="1">
+            <a:schemeClr val="accent1"/>
+          </a:lnRef>
+          <a:fillRef idx="0">
+            <a:schemeClr val="accent1"/>
+          </a:fillRef>
+          <a:effectRef idx="0">
+            <a:schemeClr val="accent1"/>
+          </a:effectRef>
+          <a:fontRef idx="minor">
+            <a:schemeClr val="tx1"/>
+          </a:fontRef>
+        </p:style>
+      </p:cxnSp>
+      <p:cxnSp>
+        <p:nvCxnSpPr>
+          <p:cNvPr id="74" name="Straight Arrow Connector 73">
+            <a:extLst>
+              <a:ext uri="{FF2B5EF4-FFF2-40B4-BE49-F238E27FC236}">
+                <a16:creationId xmlns:a16="http://schemas.microsoft.com/office/drawing/2014/main" xmlns="" id="{9FE984B0-9FCD-487E-8300-F2F3DB3897D0}"/>
+              </a:ext>
+            </a:extLst>
+          </p:cNvPr>
+          <p:cNvCxnSpPr/>
+          <p:nvPr/>
+        </p:nvCxnSpPr>
+        <p:spPr>
+          <a:xfrm>
+            <a:off x="6793996" y="37958233"/>
+            <a:ext cx="987566" cy="0"/>
+          </a:xfrm>
+          <a:prstGeom prst="straightConnector1">
+            <a:avLst/>
+          </a:prstGeom>
+          <a:ln w="76200">
+            <a:solidFill>
+              <a:schemeClr val="accent6">
+                <a:lumMod val="50000"/>
+              </a:schemeClr>
+            </a:solidFill>
+            <a:tailEnd type="triangle"/>
+          </a:ln>
+        </p:spPr>
+        <p:style>
+          <a:lnRef idx="1">
+            <a:schemeClr val="accent1"/>
+          </a:lnRef>
+          <a:fillRef idx="0">
+            <a:schemeClr val="accent1"/>
+          </a:fillRef>
+          <a:effectRef idx="0">
+            <a:schemeClr val="accent1"/>
+          </a:effectRef>
+          <a:fontRef idx="minor">
+            <a:schemeClr val="tx1"/>
+          </a:fontRef>
+        </p:style>
+      </p:cxnSp>
     </p:spTree>
     <p:extLst>
       <p:ext uri="{BB962C8B-B14F-4D97-AF65-F5344CB8AC3E}">
@@ -5389,9 +7442,9 @@
 </file>
 
 <file path=ppt/theme/theme1.xml><?xml version="1.0" encoding="utf-8"?>
-<a:theme xmlns:a="http://schemas.openxmlformats.org/drawingml/2006/main" name="Office Theme">
+<a:theme xmlns:a="http://schemas.openxmlformats.org/drawingml/2006/main" name="Parcel">
   <a:themeElements>
-    <a:clrScheme name="Office Theme">
+    <a:clrScheme name="Blue Green">
       <a:dk1>
         <a:sysClr val="windowText" lastClr="000000"/>
       </a:dk1>
@@ -5399,81 +7452,48 @@
         <a:sysClr val="window" lastClr="FFFFFF"/>
       </a:lt1>
       <a:dk2>
-        <a:srgbClr val="44546A"/>
+        <a:srgbClr val="373545"/>
       </a:dk2>
       <a:lt2>
-        <a:srgbClr val="E7E6E6"/>
+        <a:srgbClr val="CEDBE6"/>
       </a:lt2>
       <a:accent1>
-        <a:srgbClr val="4472C4"/>
+        <a:srgbClr val="3494BA"/>
       </a:accent1>
       <a:accent2>
-        <a:srgbClr val="ED7D31"/>
+        <a:srgbClr val="58B6C0"/>
       </a:accent2>
       <a:accent3>
-        <a:srgbClr val="A5A5A5"/>
+        <a:srgbClr val="75BDA7"/>
       </a:accent3>
       <a:accent4>
-        <a:srgbClr val="FFC000"/>
+        <a:srgbClr val="7A8C8E"/>
       </a:accent4>
       <a:accent5>
-        <a:srgbClr val="5B9BD5"/>
+        <a:srgbClr val="84ACB6"/>
       </a:accent5>
       <a:accent6>
-        <a:srgbClr val="70AD47"/>
+        <a:srgbClr val="2683C6"/>
       </a:accent6>
       <a:hlink>
-        <a:srgbClr val="0563C1"/>
+        <a:srgbClr val="6B9F25"/>
       </a:hlink>
       <a:folHlink>
-        <a:srgbClr val="954F72"/>
+        <a:srgbClr val="9F6715"/>
       </a:folHlink>
     </a:clrScheme>
-    <a:fontScheme name="Office Theme">
+    <a:fontScheme name="Parcel">
       <a:majorFont>
-        <a:latin typeface="Calibri Light" panose="020F0302020204030204"/>
+        <a:latin typeface="Gill Sans MT" panose="020B0502020104020203"/>
         <a:ea typeface=""/>
         <a:cs typeface=""/>
-        <a:font script="Jpan" typeface="游ゴシック Light"/>
-        <a:font script="Hang" typeface="맑은 고딕"/>
-        <a:font script="Hans" typeface="等线 Light"/>
-        <a:font script="Hant" typeface="新細明體"/>
-        <a:font script="Arab" typeface="Times New Roman"/>
-        <a:font script="Hebr" typeface="Times New Roman"/>
-        <a:font script="Thai" typeface="Angsana New"/>
-        <a:font script="Ethi" typeface="Nyala"/>
-        <a:font script="Beng" typeface="Vrinda"/>
-        <a:font script="Gujr" typeface="Shruti"/>
-        <a:font script="Khmr" typeface="MoolBoran"/>
-        <a:font script="Knda" typeface="Tunga"/>
-        <a:font script="Guru" typeface="Raavi"/>
-        <a:font script="Cans" typeface="Euphemia"/>
-        <a:font script="Cher" typeface="Plantagenet Cherokee"/>
-        <a:font script="Yiii" typeface="Microsoft Yi Baiti"/>
-        <a:font script="Tibt" typeface="Microsoft Himalaya"/>
-        <a:font script="Thaa" typeface="MV Boli"/>
-        <a:font script="Deva" typeface="Mangal"/>
-        <a:font script="Telu" typeface="Gautami"/>
-        <a:font script="Taml" typeface="Latha"/>
-        <a:font script="Syrc" typeface="Estrangelo Edessa"/>
-        <a:font script="Orya" typeface="Kalinga"/>
-        <a:font script="Mlym" typeface="Kartika"/>
-        <a:font script="Laoo" typeface="DokChampa"/>
-        <a:font script="Sinh" typeface="Iskoola Pota"/>
-        <a:font script="Mong" typeface="Mongolian Baiti"/>
-        <a:font script="Viet" typeface="Times New Roman"/>
-        <a:font script="Uigh" typeface="Microsoft Uighur"/>
-        <a:font script="Geor" typeface="Sylfaen"/>
-      </a:majorFont>
-      <a:minorFont>
-        <a:latin typeface="Calibri" panose="020F0502020204030204"/>
-        <a:ea typeface=""/>
-        <a:cs typeface=""/>
-        <a:font script="Jpan" typeface="游ゴシック"/>
-        <a:font script="Hang" typeface="맑은 고딕"/>
-        <a:font script="Hans" typeface="等线"/>
-        <a:font script="Hant" typeface="新細明體"/>
-        <a:font script="Arab" typeface="Arial"/>
+        <a:font script="Grek" typeface="Corbel"/>
+        <a:font script="Cyrl" typeface="Corbel"/>
+        <a:font script="Jpan" typeface="HGｺﾞｼｯｸE"/>
+        <a:font script="Hang" typeface="휴먼매직체"/>
+        <a:font script="Hans" typeface="华文中宋"/>
+        <a:font script="Hant" typeface="微軟正黑體"/>
+        <a:font script="Arab" typeface="Majalla UI"/>
         <a:font script="Hebr" typeface="Arial"/>
         <a:font script="Thai" typeface="Cordia New"/>
         <a:font script="Ethi" typeface="Nyala"/>
@@ -5496,12 +7516,49 @@
         <a:font script="Laoo" typeface="DokChampa"/>
         <a:font script="Sinh" typeface="Iskoola Pota"/>
         <a:font script="Mong" typeface="Mongolian Baiti"/>
-        <a:font script="Viet" typeface="Arial"/>
+        <a:font script="Viet" typeface="Tahoma"/>
+        <a:font script="Uigh" typeface="Microsoft Uighur"/>
+        <a:font script="Geor" typeface="Sylfaen"/>
+      </a:majorFont>
+      <a:minorFont>
+        <a:latin typeface="Gill Sans MT" panose="020B0502020104020203"/>
+        <a:ea typeface=""/>
+        <a:cs typeface=""/>
+        <a:font script="Grek" typeface="Corbel"/>
+        <a:font script="Cyrl" typeface="Corbel"/>
+        <a:font script="Jpan" typeface="HGｺﾞｼｯｸE"/>
+        <a:font script="Hang" typeface="휴먼매직체"/>
+        <a:font script="Hans" typeface="华文中宋"/>
+        <a:font script="Hant" typeface="微軟正黑體"/>
+        <a:font script="Arab" typeface="Majalla UI"/>
+        <a:font script="Hebr" typeface="Arial"/>
+        <a:font script="Thai" typeface="Cordia New"/>
+        <a:font script="Ethi" typeface="Nyala"/>
+        <a:font script="Beng" typeface="Vrinda"/>
+        <a:font script="Gujr" typeface="Shruti"/>
+        <a:font script="Khmr" typeface="DaunPenh"/>
+        <a:font script="Knda" typeface="Tunga"/>
+        <a:font script="Guru" typeface="Raavi"/>
+        <a:font script="Cans" typeface="Euphemia"/>
+        <a:font script="Cher" typeface="Plantagenet Cherokee"/>
+        <a:font script="Yiii" typeface="Microsoft Yi Baiti"/>
+        <a:font script="Tibt" typeface="Microsoft Himalaya"/>
+        <a:font script="Thaa" typeface="MV Boli"/>
+        <a:font script="Deva" typeface="Mangal"/>
+        <a:font script="Telu" typeface="Gautami"/>
+        <a:font script="Taml" typeface="Latha"/>
+        <a:font script="Syrc" typeface="Estrangelo Edessa"/>
+        <a:font script="Orya" typeface="Kalinga"/>
+        <a:font script="Mlym" typeface="Kartika"/>
+        <a:font script="Laoo" typeface="DokChampa"/>
+        <a:font script="Sinh" typeface="Iskoola Pota"/>
+        <a:font script="Mong" typeface="Mongolian Baiti"/>
+        <a:font script="Viet" typeface="Tahoma"/>
         <a:font script="Uigh" typeface="Microsoft Uighur"/>
         <a:font script="Geor" typeface="Sylfaen"/>
       </a:minorFont>
     </a:fontScheme>
-    <a:fmtScheme name="Office Theme">
+    <a:fmtScheme name="Parcel">
       <a:fillStyleLst>
         <a:solidFill>
           <a:schemeClr val="phClr"/>
@@ -5510,23 +7567,16 @@
           <a:gsLst>
             <a:gs pos="0">
               <a:schemeClr val="phClr">
-                <a:lumMod val="110000"/>
-                <a:satMod val="105000"/>
-                <a:tint val="67000"/>
-              </a:schemeClr>
-            </a:gs>
-            <a:gs pos="50000">
-              <a:schemeClr val="phClr">
-                <a:lumMod val="105000"/>
-                <a:satMod val="103000"/>
-                <a:tint val="73000"/>
+                <a:tint val="80000"/>
+                <a:satMod val="107000"/>
+                <a:lumMod val="103000"/>
               </a:schemeClr>
             </a:gs>
             <a:gs pos="100000">
               <a:schemeClr val="phClr">
-                <a:lumMod val="105000"/>
+                <a:tint val="82000"/>
                 <a:satMod val="109000"/>
-                <a:tint val="81000"/>
+                <a:lumMod val="103000"/>
               </a:schemeClr>
             </a:gs>
           </a:gsLst>
@@ -5536,23 +7586,23 @@
           <a:gsLst>
             <a:gs pos="0">
               <a:schemeClr val="phClr">
-                <a:satMod val="103000"/>
+                <a:tint val="97000"/>
+                <a:satMod val="100000"/>
                 <a:lumMod val="102000"/>
-                <a:tint val="94000"/>
               </a:schemeClr>
             </a:gs>
             <a:gs pos="50000">
               <a:schemeClr val="phClr">
-                <a:satMod val="110000"/>
+                <a:shade val="100000"/>
+                <a:satMod val="103000"/>
                 <a:lumMod val="100000"/>
-                <a:shade val="100000"/>
               </a:schemeClr>
             </a:gs>
             <a:gs pos="100000">
               <a:schemeClr val="phClr">
+                <a:shade val="93000"/>
+                <a:satMod val="110000"/>
                 <a:lumMod val="99000"/>
-                <a:satMod val="120000"/>
-                <a:shade val="78000"/>
               </a:schemeClr>
             </a:gs>
           </a:gsLst>
@@ -5565,21 +7615,18 @@
             <a:schemeClr val="phClr"/>
           </a:solidFill>
           <a:prstDash val="solid"/>
-          <a:miter lim="800000"/>
         </a:ln>
         <a:ln w="12700" cap="flat" cmpd="sng" algn="ctr">
           <a:solidFill>
             <a:schemeClr val="phClr"/>
           </a:solidFill>
           <a:prstDash val="solid"/>
-          <a:miter lim="800000"/>
         </a:ln>
-        <a:ln w="19050" cap="flat" cmpd="sng" algn="ctr">
+        <a:ln w="31750" cap="flat" cmpd="sng" algn="ctr">
           <a:solidFill>
             <a:schemeClr val="phClr"/>
           </a:solidFill>
           <a:prstDash val="solid"/>
-          <a:miter lim="800000"/>
         </a:ln>
       </a:lnStyleLst>
       <a:effectStyleLst>
@@ -5591,12 +7638,21 @@
         </a:effectStyle>
         <a:effectStyle>
           <a:effectLst>
-            <a:outerShdw blurRad="57150" dist="19050" dir="5400000" algn="ctr" rotWithShape="0">
+            <a:outerShdw blurRad="55880" dist="15240" dir="5400000" algn="ctr" rotWithShape="0">
               <a:srgbClr val="000000">
-                <a:alpha val="63000"/>
+                <a:alpha val="45000"/>
               </a:srgbClr>
             </a:outerShdw>
           </a:effectLst>
+          <a:scene3d>
+            <a:camera prst="orthographicFront">
+              <a:rot lat="0" lon="0" rev="0"/>
+            </a:camera>
+            <a:lightRig rig="brightRoom" dir="tl"/>
+          </a:scene3d>
+          <a:sp3d prstMaterial="dkEdge">
+            <a:bevelT w="0" h="0"/>
+          </a:sp3d>
         </a:effectStyle>
       </a:effectStyleLst>
       <a:bgFillStyleLst>
@@ -5613,28 +7669,24 @@
           <a:gsLst>
             <a:gs pos="0">
               <a:schemeClr val="phClr">
-                <a:tint val="93000"/>
-                <a:satMod val="150000"/>
-                <a:shade val="98000"/>
-                <a:lumMod val="102000"/>
-              </a:schemeClr>
-            </a:gs>
-            <a:gs pos="50000">
-              <a:schemeClr val="phClr">
-                <a:tint val="98000"/>
-                <a:satMod val="130000"/>
-                <a:shade val="90000"/>
-                <a:lumMod val="103000"/>
+                <a:tint val="97000"/>
+                <a:shade val="100000"/>
+                <a:satMod val="185000"/>
+                <a:lumMod val="120000"/>
               </a:schemeClr>
             </a:gs>
             <a:gs pos="100000">
               <a:schemeClr val="phClr">
-                <a:shade val="63000"/>
-                <a:satMod val="120000"/>
+                <a:tint val="96000"/>
+                <a:shade val="95000"/>
+                <a:satMod val="215000"/>
+                <a:lumMod val="80000"/>
               </a:schemeClr>
             </a:gs>
           </a:gsLst>
-          <a:lin ang="5400000" scaled="0"/>
+          <a:path path="circle">
+            <a:fillToRect l="50000" t="55000" r="125000" b="100000"/>
+          </a:path>
         </a:gradFill>
       </a:bgFillStyleLst>
     </a:fmtScheme>
@@ -5643,7 +7695,7 @@
   <a:extraClrSchemeLst/>
   <a:extLst>
     <a:ext uri="{05A4C25C-085E-4340-85A3-A5531E510DB2}">
-      <thm15:themeFamily xmlns:thm15="http://schemas.microsoft.com/office/thememl/2012/main" name="Office Theme" id="{62F939B6-93AF-4DB8-9C6B-D6C7DFDC589F}" vid="{4A3C46E8-61CC-4603-A589-7422A47A8E4A}"/>
+      <thm15:themeFamily xmlns:thm15="http://schemas.microsoft.com/office/thememl/2012/main" name="Parcel" id="{8BEC4385-4EB9-4D53-BFB5-0EA123736B6D}" vid="{A425FB89-E954-4A2A-81DC-D90804A94DBA}"/>
     </a:ext>
   </a:extLst>
 </a:theme>

</xml_diff>